<commit_message>
Stosunek wejście/wyjście w agg - obadać
</commit_message>
<xml_diff>
--- a/Seminarium.pptx
+++ b/Seminarium.pptx
@@ -14,6 +14,11 @@
     <p:sldId id="262" r:id="rId8"/>
     <p:sldId id="263" r:id="rId9"/>
     <p:sldId id="264" r:id="rId10"/>
+    <p:sldId id="269" r:id="rId11"/>
+    <p:sldId id="265" r:id="rId12"/>
+    <p:sldId id="266" r:id="rId13"/>
+    <p:sldId id="267" r:id="rId14"/>
+    <p:sldId id="268" r:id="rId15"/>
   </p:sldIdLst>
   <p:sldSz cx="12192000" cy="6858000"/>
   <p:notesSz cx="6858000" cy="9144000"/>
@@ -112,6 +117,11 @@
       </a:defRPr>
     </a:lvl9pPr>
   </p:defaultTextStyle>
+  <p:extLst>
+    <p:ext uri="{EFAFB233-063F-42B5-8137-9DF3F51BA10A}">
+      <p15:sldGuideLst xmlns:p15="http://schemas.microsoft.com/office/powerpoint/2012/main"/>
+    </p:ext>
+  </p:extLst>
 </p:presentation>
 </file>
 
@@ -3392,6 +3402,2539 @@
 </p:sld>
 </file>
 
+<file path=ppt/slides/slide10.xml><?xml version="1.0" encoding="utf-8"?>
+<p:sld xmlns:a="http://schemas.openxmlformats.org/drawingml/2006/main" xmlns:r="http://schemas.openxmlformats.org/officeDocument/2006/relationships" xmlns:p="http://schemas.openxmlformats.org/presentationml/2006/main">
+  <p:cSld>
+    <p:spTree>
+      <p:nvGrpSpPr>
+        <p:cNvPr id="1" name=""/>
+        <p:cNvGrpSpPr/>
+        <p:nvPr/>
+      </p:nvGrpSpPr>
+      <p:grpSpPr>
+        <a:xfrm>
+          <a:off x="0" y="0"/>
+          <a:ext cx="0" cy="0"/>
+          <a:chOff x="0" y="0"/>
+          <a:chExt cx="0" cy="0"/>
+        </a:xfrm>
+      </p:grpSpPr>
+      <p:sp>
+        <p:nvSpPr>
+          <p:cNvPr id="2" name="Tytuł 1">
+            <a:extLst>
+              <a:ext uri="{FF2B5EF4-FFF2-40B4-BE49-F238E27FC236}">
+                <a16:creationId xmlns:a16="http://schemas.microsoft.com/office/drawing/2014/main" id="{471307AD-9F14-5040-0CBA-B413C2E8AB5D}"/>
+              </a:ext>
+            </a:extLst>
+          </p:cNvPr>
+          <p:cNvSpPr>
+            <a:spLocks noGrp="1"/>
+          </p:cNvSpPr>
+          <p:nvPr>
+            <p:ph type="title"/>
+          </p:nvPr>
+        </p:nvSpPr>
+        <p:spPr/>
+        <p:txBody>
+          <a:bodyPr/>
+          <a:lstStyle/>
+          <a:p>
+            <a:endParaRPr lang="pl-PL"/>
+          </a:p>
+        </p:txBody>
+      </p:sp>
+      <p:sp>
+        <p:nvSpPr>
+          <p:cNvPr id="3" name="Symbol zastępczy zawartości 2">
+            <a:extLst>
+              <a:ext uri="{FF2B5EF4-FFF2-40B4-BE49-F238E27FC236}">
+                <a16:creationId xmlns:a16="http://schemas.microsoft.com/office/drawing/2014/main" id="{6B4229BA-3366-F024-C44F-C710278BE3D2}"/>
+              </a:ext>
+            </a:extLst>
+          </p:cNvPr>
+          <p:cNvSpPr>
+            <a:spLocks noGrp="1"/>
+          </p:cNvSpPr>
+          <p:nvPr>
+            <p:ph idx="1"/>
+          </p:nvPr>
+        </p:nvSpPr>
+        <p:spPr/>
+        <p:txBody>
+          <a:bodyPr/>
+          <a:lstStyle/>
+          <a:p>
+            <a:r>
+              <a:rPr lang="pl-PL" dirty="0"/>
+              <a:t>http://if.pw.edu.pl/~tomgrad/sn/09-nonseq/#/1</a:t>
+            </a:r>
+          </a:p>
+        </p:txBody>
+      </p:sp>
+    </p:spTree>
+    <p:extLst>
+      <p:ext uri="{BB962C8B-B14F-4D97-AF65-F5344CB8AC3E}">
+        <p14:creationId xmlns:p14="http://schemas.microsoft.com/office/powerpoint/2010/main" val="4043122510"/>
+      </p:ext>
+    </p:extLst>
+  </p:cSld>
+  <p:clrMapOvr>
+    <a:masterClrMapping/>
+  </p:clrMapOvr>
+</p:sld>
+</file>
+
+<file path=ppt/slides/slide11.xml><?xml version="1.0" encoding="utf-8"?>
+<p:sld xmlns:a="http://schemas.openxmlformats.org/drawingml/2006/main" xmlns:r="http://schemas.openxmlformats.org/officeDocument/2006/relationships" xmlns:p="http://schemas.openxmlformats.org/presentationml/2006/main">
+  <p:cSld>
+    <p:spTree>
+      <p:nvGrpSpPr>
+        <p:cNvPr id="1" name=""/>
+        <p:cNvGrpSpPr/>
+        <p:nvPr/>
+      </p:nvGrpSpPr>
+      <p:grpSpPr>
+        <a:xfrm>
+          <a:off x="0" y="0"/>
+          <a:ext cx="0" cy="0"/>
+          <a:chOff x="0" y="0"/>
+          <a:chExt cx="0" cy="0"/>
+        </a:xfrm>
+      </p:grpSpPr>
+      <p:sp>
+        <p:nvSpPr>
+          <p:cNvPr id="2" name="Tytuł 1">
+            <a:extLst>
+              <a:ext uri="{FF2B5EF4-FFF2-40B4-BE49-F238E27FC236}">
+                <a16:creationId xmlns:a16="http://schemas.microsoft.com/office/drawing/2014/main" id="{E92FFE10-6D3D-E177-6DFE-451F689A9233}"/>
+              </a:ext>
+            </a:extLst>
+          </p:cNvPr>
+          <p:cNvSpPr>
+            <a:spLocks noGrp="1"/>
+          </p:cNvSpPr>
+          <p:nvPr>
+            <p:ph type="title"/>
+          </p:nvPr>
+        </p:nvSpPr>
+        <p:spPr/>
+        <p:txBody>
+          <a:bodyPr/>
+          <a:lstStyle/>
+          <a:p>
+            <a:endParaRPr lang="pl-PL" dirty="0"/>
+          </a:p>
+        </p:txBody>
+      </p:sp>
+      <p:sp>
+        <p:nvSpPr>
+          <p:cNvPr id="4" name="Rectangle 1">
+            <a:extLst>
+              <a:ext uri="{FF2B5EF4-FFF2-40B4-BE49-F238E27FC236}">
+                <a16:creationId xmlns:a16="http://schemas.microsoft.com/office/drawing/2014/main" id="{26631BEC-FED5-4F08-ECA7-21C5F90023A0}"/>
+              </a:ext>
+            </a:extLst>
+          </p:cNvPr>
+          <p:cNvSpPr>
+            <a:spLocks noGrp="1" noChangeArrowheads="1"/>
+          </p:cNvSpPr>
+          <p:nvPr>
+            <p:ph idx="1"/>
+          </p:nvPr>
+        </p:nvSpPr>
+        <p:spPr bwMode="auto">
+          <a:prstGeom prst="rect">
+            <a:avLst/>
+          </a:prstGeom>
+          <a:solidFill>
+            <a:srgbClr val="F7F3DE"/>
+          </a:solidFill>
+          <a:ln>
+            <a:noFill/>
+          </a:ln>
+          <a:effectLst/>
+          <a:extLst>
+            <a:ext uri="{91240B29-F687-4F45-9708-019B960494DF}">
+              <a14:hiddenLine xmlns:a14="http://schemas.microsoft.com/office/drawing/2010/main" w="9525">
+                <a:solidFill>
+                  <a:schemeClr val="tx1"/>
+                </a:solidFill>
+                <a:miter lim="800000"/>
+                <a:headEnd/>
+                <a:tailEnd/>
+              </a14:hiddenLine>
+            </a:ext>
+            <a:ext uri="{AF507438-7753-43E0-B8FC-AC1667EBCBE1}">
+              <a14:hiddenEffects xmlns:a14="http://schemas.microsoft.com/office/drawing/2010/main">
+                <a:effectLst>
+                  <a:outerShdw dist="35921" dir="2700000" algn="ctr" rotWithShape="0">
+                    <a:schemeClr val="bg2"/>
+                  </a:outerShdw>
+                </a:effectLst>
+              </a14:hiddenEffects>
+            </a:ext>
+          </a:extLst>
+        </p:spPr>
+        <p:txBody>
+          <a:bodyPr vert="horz" wrap="none" lIns="0" tIns="0" rIns="0" bIns="0" numCol="1" anchor="ctr" anchorCtr="0" compatLnSpc="1">
+            <a:prstTxWarp prst="textNoShape">
+              <a:avLst/>
+            </a:prstTxWarp>
+            <a:spAutoFit/>
+          </a:bodyPr>
+          <a:lstStyle>
+            <a:lvl1pPr eaLnBrk="0" fontAlgn="base" hangingPunct="0">
+              <a:spcBef>
+                <a:spcPct val="0"/>
+              </a:spcBef>
+              <a:spcAft>
+                <a:spcPct val="0"/>
+              </a:spcAft>
+              <a:defRPr>
+                <a:solidFill>
+                  <a:schemeClr val="tx1"/>
+                </a:solidFill>
+                <a:latin typeface="Arial" panose="020B0604020202020204" pitchFamily="34" charset="0"/>
+              </a:defRPr>
+            </a:lvl1pPr>
+            <a:lvl2pPr eaLnBrk="0" fontAlgn="base" hangingPunct="0">
+              <a:spcBef>
+                <a:spcPct val="0"/>
+              </a:spcBef>
+              <a:spcAft>
+                <a:spcPct val="0"/>
+              </a:spcAft>
+              <a:defRPr>
+                <a:solidFill>
+                  <a:schemeClr val="tx1"/>
+                </a:solidFill>
+                <a:latin typeface="Arial" panose="020B0604020202020204" pitchFamily="34" charset="0"/>
+              </a:defRPr>
+            </a:lvl2pPr>
+            <a:lvl3pPr eaLnBrk="0" fontAlgn="base" hangingPunct="0">
+              <a:spcBef>
+                <a:spcPct val="0"/>
+              </a:spcBef>
+              <a:spcAft>
+                <a:spcPct val="0"/>
+              </a:spcAft>
+              <a:defRPr>
+                <a:solidFill>
+                  <a:schemeClr val="tx1"/>
+                </a:solidFill>
+                <a:latin typeface="Arial" panose="020B0604020202020204" pitchFamily="34" charset="0"/>
+              </a:defRPr>
+            </a:lvl3pPr>
+            <a:lvl4pPr eaLnBrk="0" fontAlgn="base" hangingPunct="0">
+              <a:spcBef>
+                <a:spcPct val="0"/>
+              </a:spcBef>
+              <a:spcAft>
+                <a:spcPct val="0"/>
+              </a:spcAft>
+              <a:defRPr>
+                <a:solidFill>
+                  <a:schemeClr val="tx1"/>
+                </a:solidFill>
+                <a:latin typeface="Arial" panose="020B0604020202020204" pitchFamily="34" charset="0"/>
+              </a:defRPr>
+            </a:lvl4pPr>
+            <a:lvl5pPr eaLnBrk="0" fontAlgn="base" hangingPunct="0">
+              <a:spcBef>
+                <a:spcPct val="0"/>
+              </a:spcBef>
+              <a:spcAft>
+                <a:spcPct val="0"/>
+              </a:spcAft>
+              <a:defRPr>
+                <a:solidFill>
+                  <a:schemeClr val="tx1"/>
+                </a:solidFill>
+                <a:latin typeface="Arial" panose="020B0604020202020204" pitchFamily="34" charset="0"/>
+              </a:defRPr>
+            </a:lvl5pPr>
+            <a:lvl6pPr eaLnBrk="0" fontAlgn="base" hangingPunct="0">
+              <a:spcBef>
+                <a:spcPct val="0"/>
+              </a:spcBef>
+              <a:spcAft>
+                <a:spcPct val="0"/>
+              </a:spcAft>
+              <a:defRPr>
+                <a:solidFill>
+                  <a:schemeClr val="tx1"/>
+                </a:solidFill>
+                <a:latin typeface="Arial" panose="020B0604020202020204" pitchFamily="34" charset="0"/>
+              </a:defRPr>
+            </a:lvl6pPr>
+            <a:lvl7pPr eaLnBrk="0" fontAlgn="base" hangingPunct="0">
+              <a:spcBef>
+                <a:spcPct val="0"/>
+              </a:spcBef>
+              <a:spcAft>
+                <a:spcPct val="0"/>
+              </a:spcAft>
+              <a:defRPr>
+                <a:solidFill>
+                  <a:schemeClr val="tx1"/>
+                </a:solidFill>
+                <a:latin typeface="Arial" panose="020B0604020202020204" pitchFamily="34" charset="0"/>
+              </a:defRPr>
+            </a:lvl7pPr>
+            <a:lvl8pPr eaLnBrk="0" fontAlgn="base" hangingPunct="0">
+              <a:spcBef>
+                <a:spcPct val="0"/>
+              </a:spcBef>
+              <a:spcAft>
+                <a:spcPct val="0"/>
+              </a:spcAft>
+              <a:defRPr>
+                <a:solidFill>
+                  <a:schemeClr val="tx1"/>
+                </a:solidFill>
+                <a:latin typeface="Arial" panose="020B0604020202020204" pitchFamily="34" charset="0"/>
+              </a:defRPr>
+            </a:lvl8pPr>
+            <a:lvl9pPr eaLnBrk="0" fontAlgn="base" hangingPunct="0">
+              <a:spcBef>
+                <a:spcPct val="0"/>
+              </a:spcBef>
+              <a:spcAft>
+                <a:spcPct val="0"/>
+              </a:spcAft>
+              <a:defRPr>
+                <a:solidFill>
+                  <a:schemeClr val="tx1"/>
+                </a:solidFill>
+                <a:latin typeface="Arial" panose="020B0604020202020204" pitchFamily="34" charset="0"/>
+              </a:defRPr>
+            </a:lvl9pPr>
+          </a:lstStyle>
+          <a:p>
+            <a:pPr marL="0" marR="0" lvl="0" indent="0" algn="l" defTabSz="914400" rtl="0" eaLnBrk="0" fontAlgn="base" latinLnBrk="0" hangingPunct="0">
+              <a:lnSpc>
+                <a:spcPct val="100000"/>
+              </a:lnSpc>
+              <a:spcBef>
+                <a:spcPct val="0"/>
+              </a:spcBef>
+              <a:spcAft>
+                <a:spcPct val="0"/>
+              </a:spcAft>
+              <a:buClrTx/>
+              <a:buSzTx/>
+              <a:buFontTx/>
+              <a:buNone/>
+              <a:tabLst/>
+            </a:pPr>
+            <a:endParaRPr kumimoji="0" lang="pl-PL" altLang="pl-PL" sz="3600" b="0" i="0" u="none" strike="noStrike" cap="none" normalizeH="0" baseline="0" dirty="0">
+              <a:ln>
+                <a:noFill/>
+              </a:ln>
+              <a:solidFill>
+                <a:srgbClr val="333333"/>
+              </a:solidFill>
+              <a:effectLst/>
+              <a:latin typeface="EB Garamond" panose="00000500000000000000" pitchFamily="2" charset="0"/>
+            </a:endParaRPr>
+          </a:p>
+          <a:p>
+            <a:pPr marL="0" marR="0" lvl="0" indent="0" algn="l" defTabSz="914400" rtl="0" eaLnBrk="0" fontAlgn="base" latinLnBrk="0" hangingPunct="0">
+              <a:lnSpc>
+                <a:spcPct val="100000"/>
+              </a:lnSpc>
+              <a:spcBef>
+                <a:spcPct val="0"/>
+              </a:spcBef>
+              <a:spcAft>
+                <a:spcPct val="0"/>
+              </a:spcAft>
+              <a:buClrTx/>
+              <a:buSzTx/>
+              <a:buFontTx/>
+              <a:buChar char="•"/>
+              <a:tabLst/>
+            </a:pPr>
+            <a:r>
+              <a:rPr kumimoji="0" lang="pl-PL" altLang="pl-PL" sz="3600" b="0" i="0" u="none" strike="noStrike" cap="none" normalizeH="0" baseline="0" dirty="0">
+                <a:ln>
+                  <a:noFill/>
+                </a:ln>
+                <a:solidFill>
+                  <a:srgbClr val="333333"/>
+                </a:solidFill>
+                <a:effectLst/>
+                <a:latin typeface="EB Garamond" panose="00000500000000000000" pitchFamily="2" charset="0"/>
+              </a:rPr>
+              <a:t>agregacja wielopoziomowa (</a:t>
+            </a:r>
+            <a:r>
+              <a:rPr kumimoji="0" lang="pl-PL" altLang="pl-PL" sz="3600" b="0" i="0" u="none" strike="noStrike" cap="none" normalizeH="0" baseline="0" dirty="0" err="1">
+                <a:ln>
+                  <a:noFill/>
+                </a:ln>
+                <a:solidFill>
+                  <a:srgbClr val="333333"/>
+                </a:solidFill>
+                <a:effectLst/>
+                <a:latin typeface="EB Garamond" panose="00000500000000000000" pitchFamily="2" charset="0"/>
+              </a:rPr>
+              <a:t>łaczenie</a:t>
+            </a:r>
+            <a:r>
+              <a:rPr kumimoji="0" lang="pl-PL" altLang="pl-PL" sz="3600" b="0" i="0" u="none" strike="noStrike" cap="none" normalizeH="0" baseline="0" dirty="0">
+                <a:ln>
+                  <a:noFill/>
+                </a:ln>
+                <a:solidFill>
+                  <a:srgbClr val="333333"/>
+                </a:solidFill>
+                <a:effectLst/>
+                <a:latin typeface="EB Garamond" panose="00000500000000000000" pitchFamily="2" charset="0"/>
+              </a:rPr>
+              <a:t> różnych rozdzielczości i głębi)</a:t>
+            </a:r>
+          </a:p>
+          <a:p>
+            <a:pPr marL="0" marR="0" lvl="0" indent="0" algn="l" defTabSz="914400" rtl="0" eaLnBrk="0" fontAlgn="base" latinLnBrk="0" hangingPunct="0">
+              <a:lnSpc>
+                <a:spcPct val="100000"/>
+              </a:lnSpc>
+              <a:spcBef>
+                <a:spcPct val="0"/>
+              </a:spcBef>
+              <a:spcAft>
+                <a:spcPct val="0"/>
+              </a:spcAft>
+              <a:buClrTx/>
+              <a:buSzTx/>
+              <a:buFontTx/>
+              <a:buChar char="•"/>
+              <a:tabLst/>
+            </a:pPr>
+            <a:r>
+              <a:rPr kumimoji="0" lang="pl-PL" altLang="pl-PL" sz="3600" b="0" i="0" u="none" strike="noStrike" cap="none" normalizeH="0" baseline="0" dirty="0">
+                <a:ln>
+                  <a:noFill/>
+                </a:ln>
+                <a:solidFill>
+                  <a:srgbClr val="333333"/>
+                </a:solidFill>
+                <a:effectLst/>
+                <a:latin typeface="EB Garamond" panose="00000500000000000000" pitchFamily="2" charset="0"/>
+              </a:rPr>
+              <a:t>agregacja poprzez nieliniową kompozycję</a:t>
+            </a:r>
+          </a:p>
+          <a:p>
+            <a:pPr marL="0" marR="0" lvl="0" indent="0" algn="l" defTabSz="914400" rtl="0" eaLnBrk="0" fontAlgn="base" latinLnBrk="0" hangingPunct="0">
+              <a:lnSpc>
+                <a:spcPct val="100000"/>
+              </a:lnSpc>
+              <a:spcBef>
+                <a:spcPct val="0"/>
+              </a:spcBef>
+              <a:spcAft>
+                <a:spcPct val="0"/>
+              </a:spcAft>
+              <a:buClrTx/>
+              <a:buSzTx/>
+              <a:buFontTx/>
+              <a:buChar char="•"/>
+              <a:tabLst/>
+            </a:pPr>
+            <a:r>
+              <a:rPr kumimoji="0" lang="pl-PL" altLang="pl-PL" sz="3600" b="0" i="0" u="none" strike="noStrike" cap="none" normalizeH="0" baseline="0" dirty="0">
+                <a:ln>
+                  <a:noFill/>
+                </a:ln>
+                <a:solidFill>
+                  <a:srgbClr val="333333"/>
+                </a:solidFill>
+                <a:effectLst/>
+                <a:latin typeface="EB Garamond" panose="00000500000000000000" pitchFamily="2" charset="0"/>
+              </a:rPr>
+              <a:t>możliwość tworzenia struktur iteracyjnych i hierarchicznych</a:t>
+            </a:r>
+          </a:p>
+          <a:p>
+            <a:pPr marL="0" marR="0" lvl="0" indent="0" algn="l" defTabSz="914400" rtl="0" eaLnBrk="0" fontAlgn="base" latinLnBrk="0" hangingPunct="0">
+              <a:lnSpc>
+                <a:spcPct val="100000"/>
+              </a:lnSpc>
+              <a:spcBef>
+                <a:spcPct val="0"/>
+              </a:spcBef>
+              <a:spcAft>
+                <a:spcPct val="0"/>
+              </a:spcAft>
+              <a:buClrTx/>
+              <a:buSzTx/>
+              <a:buFontTx/>
+              <a:buChar char="•"/>
+              <a:tabLst/>
+            </a:pPr>
+            <a:r>
+              <a:rPr kumimoji="0" lang="pl-PL" altLang="pl-PL" sz="3600" b="0" i="0" u="none" strike="noStrike" cap="none" normalizeH="0" baseline="0" dirty="0">
+                <a:ln>
+                  <a:noFill/>
+                </a:ln>
+                <a:solidFill>
+                  <a:srgbClr val="333333"/>
+                </a:solidFill>
+                <a:effectLst/>
+                <a:latin typeface="EB Garamond" panose="00000500000000000000" pitchFamily="2" charset="0"/>
+              </a:rPr>
+              <a:t>poprawa skuteczności sieci</a:t>
+            </a:r>
+          </a:p>
+          <a:p>
+            <a:pPr marL="0" marR="0" lvl="0" indent="0" algn="l" defTabSz="914400" rtl="0" eaLnBrk="0" fontAlgn="base" latinLnBrk="0" hangingPunct="0">
+              <a:lnSpc>
+                <a:spcPct val="100000"/>
+              </a:lnSpc>
+              <a:spcBef>
+                <a:spcPct val="0"/>
+              </a:spcBef>
+              <a:spcAft>
+                <a:spcPct val="0"/>
+              </a:spcAft>
+              <a:buClrTx/>
+              <a:buSzTx/>
+              <a:buFontTx/>
+              <a:buChar char="•"/>
+              <a:tabLst/>
+            </a:pPr>
+            <a:r>
+              <a:rPr kumimoji="0" lang="pl-PL" altLang="pl-PL" sz="3600" b="0" i="0" u="none" strike="noStrike" cap="none" normalizeH="0" baseline="0" dirty="0">
+                <a:ln>
+                  <a:noFill/>
+                </a:ln>
+                <a:solidFill>
+                  <a:srgbClr val="333333"/>
+                </a:solidFill>
+                <a:effectLst/>
+                <a:latin typeface="EB Garamond" panose="00000500000000000000" pitchFamily="2" charset="0"/>
+              </a:rPr>
+              <a:t>węzły agregujące oparte na splotach </a:t>
+            </a:r>
+            <a:r>
+              <a:rPr kumimoji="0" lang="pl-PL" altLang="pl-PL" sz="3300" b="0" i="0" u="none" strike="noStrike" cap="none" normalizeH="0" baseline="0" dirty="0">
+                <a:ln>
+                  <a:noFill/>
+                </a:ln>
+                <a:solidFill>
+                  <a:srgbClr val="333333"/>
+                </a:solidFill>
+                <a:effectLst/>
+                <a:latin typeface="MathJax_Main"/>
+              </a:rPr>
+              <a:t>1×1</a:t>
+            </a:r>
+            <a:r>
+              <a:rPr kumimoji="0" lang="pl-PL" altLang="pl-PL" sz="3600" b="0" i="0" u="none" strike="noStrike" cap="none" normalizeH="0" baseline="0" dirty="0">
+                <a:ln>
+                  <a:noFill/>
+                </a:ln>
+                <a:solidFill>
+                  <a:srgbClr val="333333"/>
+                </a:solidFill>
+                <a:effectLst/>
+                <a:latin typeface="inherit"/>
+              </a:rPr>
+              <a:t>1×1</a:t>
+            </a:r>
+            <a:r>
+              <a:rPr kumimoji="0" lang="pl-PL" altLang="pl-PL" sz="3600" b="0" i="0" u="none" strike="noStrike" cap="none" normalizeH="0" baseline="0" dirty="0">
+                <a:ln>
+                  <a:noFill/>
+                </a:ln>
+                <a:solidFill>
+                  <a:srgbClr val="333333"/>
+                </a:solidFill>
+                <a:effectLst/>
+                <a:latin typeface="EB Garamond" panose="00000500000000000000" pitchFamily="2" charset="0"/>
+              </a:rPr>
+              <a:t>: </a:t>
+            </a:r>
+            <a:r>
+              <a:rPr kumimoji="0" lang="pl-PL" altLang="pl-PL" sz="3300" b="0" i="0" u="none" strike="noStrike" cap="none" normalizeH="0" baseline="0" dirty="0">
+                <a:ln>
+                  <a:noFill/>
+                </a:ln>
+                <a:solidFill>
+                  <a:srgbClr val="333333"/>
+                </a:solidFill>
+                <a:effectLst/>
+                <a:latin typeface="MathJax_Math-italic"/>
+              </a:rPr>
+              <a:t>N</a:t>
+            </a:r>
+            <a:r>
+              <a:rPr kumimoji="0" lang="pl-PL" altLang="pl-PL" sz="3300" b="0" i="0" u="none" strike="noStrike" cap="none" normalizeH="0" baseline="0" dirty="0">
+                <a:ln>
+                  <a:noFill/>
+                </a:ln>
+                <a:solidFill>
+                  <a:srgbClr val="333333"/>
+                </a:solidFill>
+                <a:effectLst/>
+                <a:latin typeface="MathJax_Main"/>
+              </a:rPr>
+              <a:t>(</a:t>
+            </a:r>
+            <a:r>
+              <a:rPr kumimoji="0" lang="pl-PL" altLang="pl-PL" sz="3300" b="0" i="0" u="none" strike="noStrike" cap="none" normalizeH="0" baseline="0" dirty="0">
+                <a:ln>
+                  <a:noFill/>
+                </a:ln>
+                <a:solidFill>
+                  <a:srgbClr val="333333"/>
+                </a:solidFill>
+                <a:effectLst/>
+                <a:latin typeface="MathJax_Math-italic"/>
+              </a:rPr>
+              <a:t>x</a:t>
+            </a:r>
+            <a:r>
+              <a:rPr kumimoji="0" lang="pl-PL" altLang="pl-PL" sz="3300" b="0" i="0" u="none" strike="noStrike" cap="none" normalizeH="0" baseline="0" dirty="0">
+                <a:ln>
+                  <a:noFill/>
+                </a:ln>
+                <a:solidFill>
+                  <a:srgbClr val="333333"/>
+                </a:solidFill>
+                <a:effectLst/>
+                <a:latin typeface="MathJax_Main"/>
+              </a:rPr>
+              <a:t>⃗ </a:t>
+            </a:r>
+            <a:r>
+              <a:rPr kumimoji="0" lang="pl-PL" altLang="pl-PL" sz="2300" b="0" i="0" u="none" strike="noStrike" cap="none" normalizeH="0" baseline="0" dirty="0">
+                <a:ln>
+                  <a:noFill/>
+                </a:ln>
+                <a:solidFill>
+                  <a:srgbClr val="333333"/>
+                </a:solidFill>
+                <a:effectLst/>
+                <a:latin typeface="MathJax_Main"/>
+              </a:rPr>
+              <a:t>1</a:t>
+            </a:r>
+            <a:r>
+              <a:rPr kumimoji="0" lang="pl-PL" altLang="pl-PL" sz="3300" b="0" i="0" u="none" strike="noStrike" cap="none" normalizeH="0" baseline="0" dirty="0">
+                <a:ln>
+                  <a:noFill/>
+                </a:ln>
+                <a:solidFill>
+                  <a:srgbClr val="333333"/>
+                </a:solidFill>
+                <a:effectLst/>
+                <a:latin typeface="MathJax_Main"/>
+              </a:rPr>
+              <a:t>,…,</a:t>
+            </a:r>
+            <a:r>
+              <a:rPr kumimoji="0" lang="pl-PL" altLang="pl-PL" sz="3300" b="0" i="0" u="none" strike="noStrike" cap="none" normalizeH="0" baseline="0" dirty="0">
+                <a:ln>
+                  <a:noFill/>
+                </a:ln>
+                <a:solidFill>
+                  <a:srgbClr val="333333"/>
+                </a:solidFill>
+                <a:effectLst/>
+                <a:latin typeface="MathJax_Math-italic"/>
+              </a:rPr>
+              <a:t>x</a:t>
+            </a:r>
+            <a:r>
+              <a:rPr kumimoji="0" lang="pl-PL" altLang="pl-PL" sz="3300" b="0" i="0" u="none" strike="noStrike" cap="none" normalizeH="0" baseline="0" dirty="0">
+                <a:ln>
+                  <a:noFill/>
+                </a:ln>
+                <a:solidFill>
+                  <a:srgbClr val="333333"/>
+                </a:solidFill>
+                <a:effectLst/>
+                <a:latin typeface="MathJax_Main"/>
+              </a:rPr>
+              <a:t>⃗ </a:t>
+            </a:r>
+            <a:r>
+              <a:rPr kumimoji="0" lang="pl-PL" altLang="pl-PL" sz="2300" b="0" i="0" u="none" strike="noStrike" cap="none" normalizeH="0" baseline="0" dirty="0">
+                <a:ln>
+                  <a:noFill/>
+                </a:ln>
+                <a:solidFill>
+                  <a:srgbClr val="333333"/>
+                </a:solidFill>
+                <a:effectLst/>
+                <a:latin typeface="MathJax_Math-italic"/>
+              </a:rPr>
+              <a:t>n</a:t>
+            </a:r>
+            <a:r>
+              <a:rPr kumimoji="0" lang="pl-PL" altLang="pl-PL" sz="3300" b="0" i="0" u="none" strike="noStrike" cap="none" normalizeH="0" baseline="0" dirty="0">
+                <a:ln>
+                  <a:noFill/>
+                </a:ln>
+                <a:solidFill>
+                  <a:srgbClr val="333333"/>
+                </a:solidFill>
+                <a:effectLst/>
+                <a:latin typeface="MathJax_Main"/>
+              </a:rPr>
+              <a:t>)=</a:t>
+            </a:r>
+            <a:r>
+              <a:rPr kumimoji="0" lang="pl-PL" altLang="pl-PL" sz="3300" b="0" i="0" u="none" strike="noStrike" cap="none" normalizeH="0" baseline="0" dirty="0">
+                <a:ln>
+                  <a:noFill/>
+                </a:ln>
+                <a:solidFill>
+                  <a:srgbClr val="333333"/>
+                </a:solidFill>
+                <a:effectLst/>
+                <a:latin typeface="MathJax_Math-italic"/>
+              </a:rPr>
+              <a:t>σ</a:t>
+            </a:r>
+            <a:r>
+              <a:rPr kumimoji="0" lang="pl-PL" altLang="pl-PL" sz="3300" b="0" i="0" u="none" strike="noStrike" cap="none" normalizeH="0" baseline="0" dirty="0">
+                <a:ln>
+                  <a:noFill/>
+                </a:ln>
+                <a:solidFill>
+                  <a:srgbClr val="333333"/>
+                </a:solidFill>
+                <a:effectLst/>
+                <a:latin typeface="MathJax_Main"/>
+              </a:rPr>
+              <a:t>(</a:t>
+            </a:r>
+            <a:r>
+              <a:rPr kumimoji="0" lang="pl-PL" altLang="pl-PL" sz="3300" b="0" i="0" u="none" strike="noStrike" cap="none" normalizeH="0" baseline="0" dirty="0" err="1">
+                <a:ln>
+                  <a:noFill/>
+                </a:ln>
+                <a:solidFill>
+                  <a:srgbClr val="333333"/>
+                </a:solidFill>
+                <a:effectLst/>
+                <a:latin typeface="MathJax_Math-italic"/>
+              </a:rPr>
+              <a:t>BatchNorm</a:t>
+            </a:r>
+            <a:r>
+              <a:rPr kumimoji="0" lang="pl-PL" altLang="pl-PL" sz="3300" b="0" i="0" u="none" strike="noStrike" cap="none" normalizeH="0" baseline="0" dirty="0">
+                <a:ln>
+                  <a:noFill/>
+                </a:ln>
+                <a:solidFill>
+                  <a:srgbClr val="333333"/>
+                </a:solidFill>
+                <a:effectLst/>
+                <a:latin typeface="MathJax_Main"/>
+              </a:rPr>
+              <a:t>(</a:t>
+            </a:r>
+            <a:r>
+              <a:rPr kumimoji="0" lang="pl-PL" altLang="pl-PL" sz="3300" b="0" i="0" u="none" strike="noStrike" cap="none" normalizeH="0" baseline="0" dirty="0">
+                <a:ln>
+                  <a:noFill/>
+                </a:ln>
+                <a:solidFill>
+                  <a:srgbClr val="333333"/>
+                </a:solidFill>
+                <a:effectLst/>
+                <a:latin typeface="MathJax_Size1"/>
+              </a:rPr>
+              <a:t>∑</a:t>
+            </a:r>
+            <a:r>
+              <a:rPr kumimoji="0" lang="pl-PL" altLang="pl-PL" sz="2300" b="0" i="0" u="none" strike="noStrike" cap="none" normalizeH="0" baseline="0" dirty="0" err="1">
+                <a:ln>
+                  <a:noFill/>
+                </a:ln>
+                <a:solidFill>
+                  <a:srgbClr val="333333"/>
+                </a:solidFill>
+                <a:effectLst/>
+                <a:latin typeface="MathJax_Math-italic"/>
+              </a:rPr>
+              <a:t>i</a:t>
+            </a:r>
+            <a:r>
+              <a:rPr kumimoji="0" lang="pl-PL" altLang="pl-PL" sz="3300" b="0" i="0" u="none" strike="noStrike" cap="none" normalizeH="0" baseline="0" dirty="0" err="1">
+                <a:ln>
+                  <a:noFill/>
+                </a:ln>
+                <a:solidFill>
+                  <a:srgbClr val="333333"/>
+                </a:solidFill>
+                <a:effectLst/>
+                <a:latin typeface="MathJax_Math-italic"/>
+              </a:rPr>
+              <a:t>W</a:t>
+            </a:r>
+            <a:r>
+              <a:rPr kumimoji="0" lang="pl-PL" altLang="pl-PL" sz="2300" b="0" i="0" u="none" strike="noStrike" cap="none" normalizeH="0" baseline="0" dirty="0" err="1">
+                <a:ln>
+                  <a:noFill/>
+                </a:ln>
+                <a:solidFill>
+                  <a:srgbClr val="333333"/>
+                </a:solidFill>
+                <a:effectLst/>
+                <a:latin typeface="MathJax_Math-italic"/>
+              </a:rPr>
+              <a:t>i</a:t>
+            </a:r>
+            <a:r>
+              <a:rPr kumimoji="0" lang="pl-PL" altLang="pl-PL" sz="3300" b="0" i="0" u="none" strike="noStrike" cap="none" normalizeH="0" baseline="0" dirty="0" err="1">
+                <a:ln>
+                  <a:noFill/>
+                </a:ln>
+                <a:solidFill>
+                  <a:srgbClr val="333333"/>
+                </a:solidFill>
+                <a:effectLst/>
+                <a:latin typeface="MathJax_Math-italic"/>
+              </a:rPr>
+              <a:t>x</a:t>
+            </a:r>
+            <a:r>
+              <a:rPr kumimoji="0" lang="pl-PL" altLang="pl-PL" sz="3300" b="0" i="0" u="none" strike="noStrike" cap="none" normalizeH="0" baseline="0" dirty="0">
+                <a:ln>
+                  <a:noFill/>
+                </a:ln>
+                <a:solidFill>
+                  <a:srgbClr val="333333"/>
+                </a:solidFill>
+                <a:effectLst/>
+                <a:latin typeface="MathJax_Main"/>
+              </a:rPr>
+              <a:t>⃗ </a:t>
+            </a:r>
+            <a:r>
+              <a:rPr kumimoji="0" lang="pl-PL" altLang="pl-PL" sz="2300" b="0" i="0" u="none" strike="noStrike" cap="none" normalizeH="0" baseline="0" dirty="0" err="1">
+                <a:ln>
+                  <a:noFill/>
+                </a:ln>
+                <a:solidFill>
+                  <a:srgbClr val="333333"/>
+                </a:solidFill>
+                <a:effectLst/>
+                <a:latin typeface="MathJax_Math-italic"/>
+              </a:rPr>
+              <a:t>i</a:t>
+            </a:r>
+            <a:r>
+              <a:rPr kumimoji="0" lang="pl-PL" altLang="pl-PL" sz="3300" b="0" i="0" u="none" strike="noStrike" cap="none" normalizeH="0" baseline="0" dirty="0" err="1">
+                <a:ln>
+                  <a:noFill/>
+                </a:ln>
+                <a:solidFill>
+                  <a:srgbClr val="333333"/>
+                </a:solidFill>
+                <a:effectLst/>
+                <a:latin typeface="MathJax_Main"/>
+              </a:rPr>
+              <a:t>+</a:t>
+            </a:r>
+            <a:r>
+              <a:rPr kumimoji="0" lang="pl-PL" altLang="pl-PL" sz="3300" b="0" i="0" u="none" strike="noStrike" cap="none" normalizeH="0" baseline="0" dirty="0" err="1">
+                <a:ln>
+                  <a:noFill/>
+                </a:ln>
+                <a:solidFill>
+                  <a:srgbClr val="333333"/>
+                </a:solidFill>
+                <a:effectLst/>
+                <a:latin typeface="MathJax_Math-italic"/>
+              </a:rPr>
+              <a:t>b</a:t>
+            </a:r>
+            <a:r>
+              <a:rPr kumimoji="0" lang="pl-PL" altLang="pl-PL" sz="3300" b="0" i="0" u="none" strike="noStrike" cap="none" normalizeH="0" baseline="0" dirty="0">
+                <a:ln>
+                  <a:noFill/>
+                </a:ln>
+                <a:solidFill>
+                  <a:srgbClr val="333333"/>
+                </a:solidFill>
+                <a:effectLst/>
+                <a:latin typeface="MathJax_Main"/>
+              </a:rPr>
+              <a:t>⃗ ))</a:t>
+            </a:r>
+            <a:r>
+              <a:rPr kumimoji="0" lang="pl-PL" altLang="pl-PL" sz="800" b="0" i="0" u="none" strike="noStrike" cap="none" normalizeH="0" baseline="0" dirty="0">
+                <a:ln>
+                  <a:noFill/>
+                </a:ln>
+                <a:solidFill>
+                  <a:schemeClr val="tx1"/>
+                </a:solidFill>
+                <a:effectLst/>
+              </a:rPr>
+              <a:t> </a:t>
+            </a:r>
+            <a:endParaRPr kumimoji="0" lang="pl-PL" altLang="pl-PL" sz="1800" b="0" i="0" u="none" strike="noStrike" cap="none" normalizeH="0" baseline="0" dirty="0">
+              <a:ln>
+                <a:noFill/>
+              </a:ln>
+              <a:solidFill>
+                <a:schemeClr val="tx1"/>
+              </a:solidFill>
+              <a:effectLst/>
+              <a:latin typeface="Arial" panose="020B0604020202020204" pitchFamily="34" charset="0"/>
+            </a:endParaRPr>
+          </a:p>
+        </p:txBody>
+      </p:sp>
+    </p:spTree>
+    <p:extLst>
+      <p:ext uri="{BB962C8B-B14F-4D97-AF65-F5344CB8AC3E}">
+        <p14:creationId xmlns:p14="http://schemas.microsoft.com/office/powerpoint/2010/main" val="2278845164"/>
+      </p:ext>
+    </p:extLst>
+  </p:cSld>
+  <p:clrMapOvr>
+    <a:masterClrMapping/>
+  </p:clrMapOvr>
+</p:sld>
+</file>
+
+<file path=ppt/slides/slide12.xml><?xml version="1.0" encoding="utf-8"?>
+<p:sld xmlns:a="http://schemas.openxmlformats.org/drawingml/2006/main" xmlns:r="http://schemas.openxmlformats.org/officeDocument/2006/relationships" xmlns:p="http://schemas.openxmlformats.org/presentationml/2006/main">
+  <p:cSld>
+    <p:spTree>
+      <p:nvGrpSpPr>
+        <p:cNvPr id="1" name=""/>
+        <p:cNvGrpSpPr/>
+        <p:nvPr/>
+      </p:nvGrpSpPr>
+      <p:grpSpPr>
+        <a:xfrm>
+          <a:off x="0" y="0"/>
+          <a:ext cx="0" cy="0"/>
+          <a:chOff x="0" y="0"/>
+          <a:chExt cx="0" cy="0"/>
+        </a:xfrm>
+      </p:grpSpPr>
+      <p:sp>
+        <p:nvSpPr>
+          <p:cNvPr id="2" name="Tytuł 1">
+            <a:extLst>
+              <a:ext uri="{FF2B5EF4-FFF2-40B4-BE49-F238E27FC236}">
+                <a16:creationId xmlns:a16="http://schemas.microsoft.com/office/drawing/2014/main" id="{31A1B28B-1FC8-4630-A470-F2766E65F1E7}"/>
+              </a:ext>
+            </a:extLst>
+          </p:cNvPr>
+          <p:cNvSpPr>
+            <a:spLocks noGrp="1"/>
+          </p:cNvSpPr>
+          <p:nvPr>
+            <p:ph type="title"/>
+          </p:nvPr>
+        </p:nvSpPr>
+        <p:spPr/>
+        <p:txBody>
+          <a:bodyPr/>
+          <a:lstStyle/>
+          <a:p>
+            <a:endParaRPr lang="pl-PL" dirty="0"/>
+          </a:p>
+        </p:txBody>
+      </p:sp>
+      <p:sp>
+        <p:nvSpPr>
+          <p:cNvPr id="3" name="Symbol zastępczy zawartości 2">
+            <a:extLst>
+              <a:ext uri="{FF2B5EF4-FFF2-40B4-BE49-F238E27FC236}">
+                <a16:creationId xmlns:a16="http://schemas.microsoft.com/office/drawing/2014/main" id="{1B836B76-3A15-3607-3FBC-E9533EF3FA12}"/>
+              </a:ext>
+            </a:extLst>
+          </p:cNvPr>
+          <p:cNvSpPr>
+            <a:spLocks noGrp="1"/>
+          </p:cNvSpPr>
+          <p:nvPr>
+            <p:ph idx="1"/>
+          </p:nvPr>
+        </p:nvSpPr>
+        <p:spPr/>
+        <p:txBody>
+          <a:bodyPr/>
+          <a:lstStyle/>
+          <a:p>
+            <a:pPr algn="l" fontAlgn="base"/>
+            <a:r>
+              <a:rPr lang="pl-PL" b="1" i="0" dirty="0">
+                <a:solidFill>
+                  <a:srgbClr val="FF8C00"/>
+                </a:solidFill>
+                <a:effectLst/>
+                <a:latin typeface="Raleway" pitchFamily="2" charset="-18"/>
+              </a:rPr>
+              <a:t>Agregacja iteratywna</a:t>
+            </a:r>
+            <a:endParaRPr lang="pl-PL" b="0" i="0" dirty="0">
+              <a:solidFill>
+                <a:srgbClr val="333333"/>
+              </a:solidFill>
+              <a:effectLst/>
+              <a:latin typeface="EB Garamond" panose="00000500000000000000" pitchFamily="2" charset="0"/>
+            </a:endParaRPr>
+          </a:p>
+          <a:p>
+            <a:pPr algn="l" fontAlgn="base">
+              <a:buFont typeface="Arial" panose="020B0604020202020204" pitchFamily="34" charset="0"/>
+              <a:buChar char="•"/>
+            </a:pPr>
+            <a:r>
+              <a:rPr lang="pl-PL" b="0" i="0" dirty="0">
+                <a:solidFill>
+                  <a:srgbClr val="333333"/>
+                </a:solidFill>
+                <a:effectLst/>
+                <a:latin typeface="EB Garamond" panose="00000500000000000000" pitchFamily="2" charset="0"/>
+              </a:rPr>
+              <a:t>kolejne poziomy odpowiadają za cechy różnego poziomu</a:t>
+            </a:r>
+          </a:p>
+          <a:p>
+            <a:pPr algn="l" fontAlgn="base">
+              <a:buFont typeface="Arial" panose="020B0604020202020204" pitchFamily="34" charset="0"/>
+              <a:buChar char="•"/>
+            </a:pPr>
+            <a:r>
+              <a:rPr lang="pl-PL" b="0" i="0" dirty="0">
+                <a:solidFill>
+                  <a:srgbClr val="333333"/>
+                </a:solidFill>
+                <a:effectLst/>
+                <a:latin typeface="EB Garamond" panose="00000500000000000000" pitchFamily="2" charset="0"/>
+              </a:rPr>
+              <a:t>węzły agregujące łączą różne rozdzielczości (skale)</a:t>
+            </a:r>
+          </a:p>
+          <a:p>
+            <a:pPr algn="l" fontAlgn="base"/>
+            <a:br>
+              <a:rPr lang="pl-PL" b="0" i="0" dirty="0">
+                <a:solidFill>
+                  <a:srgbClr val="333333"/>
+                </a:solidFill>
+                <a:effectLst/>
+                <a:latin typeface="EB Garamond" panose="00000500000000000000" pitchFamily="2" charset="0"/>
+              </a:rPr>
+            </a:br>
+            <a:r>
+              <a:rPr lang="pl-PL" b="1" i="0" dirty="0">
+                <a:solidFill>
+                  <a:srgbClr val="FF8C00"/>
+                </a:solidFill>
+                <a:effectLst/>
+                <a:latin typeface="Raleway" pitchFamily="2" charset="-18"/>
+              </a:rPr>
+              <a:t>Agregacja hierarchiczna</a:t>
+            </a:r>
+          </a:p>
+          <a:p>
+            <a:pPr algn="l" fontAlgn="base">
+              <a:buFont typeface="Arial" panose="020B0604020202020204" pitchFamily="34" charset="0"/>
+              <a:buChar char="•"/>
+            </a:pPr>
+            <a:r>
+              <a:rPr lang="pl-PL" b="0" i="0" dirty="0">
+                <a:solidFill>
+                  <a:srgbClr val="333333"/>
+                </a:solidFill>
+                <a:effectLst/>
+                <a:latin typeface="EB Garamond" panose="00000500000000000000" pitchFamily="2" charset="0"/>
+              </a:rPr>
+              <a:t>struktura drzewa</a:t>
+            </a:r>
+          </a:p>
+          <a:p>
+            <a:pPr algn="l" fontAlgn="base">
+              <a:buFont typeface="Arial" panose="020B0604020202020204" pitchFamily="34" charset="0"/>
+              <a:buChar char="•"/>
+            </a:pPr>
+            <a:r>
+              <a:rPr lang="pl-PL" b="0" i="0" dirty="0">
+                <a:solidFill>
+                  <a:srgbClr val="333333"/>
+                </a:solidFill>
+                <a:effectLst/>
+                <a:latin typeface="EB Garamond" panose="00000500000000000000" pitchFamily="2" charset="0"/>
+              </a:rPr>
+              <a:t>agregacja węzłów o tej samej głębi</a:t>
+            </a:r>
+          </a:p>
+          <a:p>
+            <a:endParaRPr lang="pl-PL" dirty="0"/>
+          </a:p>
+        </p:txBody>
+      </p:sp>
+    </p:spTree>
+    <p:extLst>
+      <p:ext uri="{BB962C8B-B14F-4D97-AF65-F5344CB8AC3E}">
+        <p14:creationId xmlns:p14="http://schemas.microsoft.com/office/powerpoint/2010/main" val="1305414581"/>
+      </p:ext>
+    </p:extLst>
+  </p:cSld>
+  <p:clrMapOvr>
+    <a:masterClrMapping/>
+  </p:clrMapOvr>
+</p:sld>
+</file>
+
+<file path=ppt/slides/slide13.xml><?xml version="1.0" encoding="utf-8"?>
+<p:sld xmlns:a="http://schemas.openxmlformats.org/drawingml/2006/main" xmlns:r="http://schemas.openxmlformats.org/officeDocument/2006/relationships" xmlns:p="http://schemas.openxmlformats.org/presentationml/2006/main">
+  <p:cSld>
+    <p:spTree>
+      <p:nvGrpSpPr>
+        <p:cNvPr id="1" name=""/>
+        <p:cNvGrpSpPr/>
+        <p:nvPr/>
+      </p:nvGrpSpPr>
+      <p:grpSpPr>
+        <a:xfrm>
+          <a:off x="0" y="0"/>
+          <a:ext cx="0" cy="0"/>
+          <a:chOff x="0" y="0"/>
+          <a:chExt cx="0" cy="0"/>
+        </a:xfrm>
+      </p:grpSpPr>
+      <p:sp>
+        <p:nvSpPr>
+          <p:cNvPr id="2" name="Tytuł 1">
+            <a:extLst>
+              <a:ext uri="{FF2B5EF4-FFF2-40B4-BE49-F238E27FC236}">
+                <a16:creationId xmlns:a16="http://schemas.microsoft.com/office/drawing/2014/main" id="{EB01DE52-6444-512D-A27B-E2A1E27259FB}"/>
+              </a:ext>
+            </a:extLst>
+          </p:cNvPr>
+          <p:cNvSpPr>
+            <a:spLocks noGrp="1"/>
+          </p:cNvSpPr>
+          <p:nvPr>
+            <p:ph type="title"/>
+          </p:nvPr>
+        </p:nvSpPr>
+        <p:spPr/>
+        <p:txBody>
+          <a:bodyPr/>
+          <a:lstStyle/>
+          <a:p>
+            <a:endParaRPr lang="pl-PL"/>
+          </a:p>
+        </p:txBody>
+      </p:sp>
+      <p:sp>
+        <p:nvSpPr>
+          <p:cNvPr id="3" name="Symbol zastępczy zawartości 2">
+            <a:extLst>
+              <a:ext uri="{FF2B5EF4-FFF2-40B4-BE49-F238E27FC236}">
+                <a16:creationId xmlns:a16="http://schemas.microsoft.com/office/drawing/2014/main" id="{DF1E83FC-766B-5D62-83C5-488E8B66D55B}"/>
+              </a:ext>
+            </a:extLst>
+          </p:cNvPr>
+          <p:cNvSpPr>
+            <a:spLocks noGrp="1"/>
+          </p:cNvSpPr>
+          <p:nvPr>
+            <p:ph idx="1"/>
+          </p:nvPr>
+        </p:nvSpPr>
+        <p:spPr/>
+        <p:txBody>
+          <a:bodyPr>
+            <a:normAutofit lnSpcReduction="10000"/>
+          </a:bodyPr>
+          <a:lstStyle/>
+          <a:p>
+            <a:pPr algn="ctr" fontAlgn="base"/>
+            <a:r>
+              <a:rPr lang="pl-PL" b="1" i="0" dirty="0">
+                <a:solidFill>
+                  <a:srgbClr val="FF8C00"/>
+                </a:solidFill>
+                <a:effectLst/>
+                <a:latin typeface="Raleway" pitchFamily="2" charset="-18"/>
+              </a:rPr>
+              <a:t>Założenia modelu </a:t>
+            </a:r>
+            <a:r>
+              <a:rPr lang="pl-PL" b="1" i="0" dirty="0" err="1">
+                <a:solidFill>
+                  <a:srgbClr val="FF8C00"/>
+                </a:solidFill>
+                <a:effectLst/>
+                <a:latin typeface="Raleway" pitchFamily="2" charset="-18"/>
+              </a:rPr>
+              <a:t>ResNet</a:t>
+            </a:r>
+            <a:endParaRPr lang="pl-PL" b="1" i="0" dirty="0">
+              <a:solidFill>
+                <a:srgbClr val="FF8C00"/>
+              </a:solidFill>
+              <a:effectLst/>
+              <a:latin typeface="Raleway" pitchFamily="2" charset="-18"/>
+            </a:endParaRPr>
+          </a:p>
+          <a:p>
+            <a:pPr algn="l" fontAlgn="base">
+              <a:buFont typeface="Arial" panose="020B0604020202020204" pitchFamily="34" charset="0"/>
+              <a:buChar char="•"/>
+            </a:pPr>
+            <a:r>
+              <a:rPr lang="pl-PL" b="0" i="0" dirty="0">
+                <a:solidFill>
+                  <a:srgbClr val="333333"/>
+                </a:solidFill>
+                <a:effectLst/>
+                <a:latin typeface="EB Garamond" panose="00000500000000000000" pitchFamily="2" charset="0"/>
+              </a:rPr>
+              <a:t>połączenia resztkowe (skróty), omijające warstwę lub grupę warstw</a:t>
+            </a:r>
+          </a:p>
+          <a:p>
+            <a:pPr algn="l" fontAlgn="base">
+              <a:buFont typeface="Arial" panose="020B0604020202020204" pitchFamily="34" charset="0"/>
+              <a:buChar char="•"/>
+            </a:pPr>
+            <a:r>
+              <a:rPr lang="pl-PL" b="0" i="0" dirty="0">
+                <a:solidFill>
+                  <a:srgbClr val="333333"/>
+                </a:solidFill>
+                <a:effectLst/>
+                <a:latin typeface="EB Garamond" panose="00000500000000000000" pitchFamily="2" charset="0"/>
+              </a:rPr>
+              <a:t>na ogół skrót omija warstwę splotową, normalizującą (np. </a:t>
+            </a:r>
+            <a:r>
+              <a:rPr lang="pl-PL" b="0" i="1" dirty="0" err="1">
+                <a:solidFill>
+                  <a:srgbClr val="333333"/>
+                </a:solidFill>
+                <a:effectLst/>
+                <a:latin typeface="inherit"/>
+              </a:rPr>
+              <a:t>BatchNorm</a:t>
+            </a:r>
+            <a:r>
+              <a:rPr lang="pl-PL" b="0" i="0" dirty="0">
+                <a:solidFill>
+                  <a:srgbClr val="333333"/>
+                </a:solidFill>
+                <a:effectLst/>
+                <a:latin typeface="EB Garamond" panose="00000500000000000000" pitchFamily="2" charset="0"/>
+              </a:rPr>
+              <a:t>) i aktywacyjną</a:t>
+            </a:r>
+          </a:p>
+          <a:p>
+            <a:pPr algn="l" fontAlgn="base">
+              <a:buFont typeface="Arial" panose="020B0604020202020204" pitchFamily="34" charset="0"/>
+              <a:buChar char="•"/>
+            </a:pPr>
+            <a:r>
+              <a:rPr lang="pl-PL" b="0" i="0" dirty="0">
+                <a:solidFill>
+                  <a:srgbClr val="333333"/>
+                </a:solidFill>
+                <a:effectLst/>
+                <a:latin typeface="EB Garamond" panose="00000500000000000000" pitchFamily="2" charset="0"/>
+              </a:rPr>
+              <a:t>skróty pozwalają na propagację gradientu ograniczając problem znikania gradientów w bardzo głębokich sieciach</a:t>
+            </a:r>
+          </a:p>
+          <a:p>
+            <a:pPr algn="l" fontAlgn="base">
+              <a:buFont typeface="Arial" panose="020B0604020202020204" pitchFamily="34" charset="0"/>
+              <a:buChar char="•"/>
+            </a:pPr>
+            <a:r>
+              <a:rPr lang="pl-PL" b="0" i="0" dirty="0">
+                <a:solidFill>
+                  <a:srgbClr val="333333"/>
+                </a:solidFill>
+                <a:effectLst/>
+                <a:latin typeface="EB Garamond" panose="00000500000000000000" pitchFamily="2" charset="0"/>
+              </a:rPr>
+              <a:t>obecność skrótów upraszcza sieć, stabilizując algorytm optymalizacji poprzez wymuszenie stopniowej eksploracji przestrzeni parametrów</a:t>
+            </a:r>
+          </a:p>
+          <a:p>
+            <a:pPr algn="l" fontAlgn="base">
+              <a:buFont typeface="Arial" panose="020B0604020202020204" pitchFamily="34" charset="0"/>
+              <a:buChar char="•"/>
+            </a:pPr>
+            <a:r>
+              <a:rPr lang="pl-PL" b="0" i="0" dirty="0">
+                <a:solidFill>
+                  <a:srgbClr val="333333"/>
+                </a:solidFill>
+                <a:effectLst/>
+                <a:latin typeface="EB Garamond" panose="00000500000000000000" pitchFamily="2" charset="0"/>
+              </a:rPr>
+              <a:t>dodanie skrótu nie zwiększa złożoności obliczeniowej, skróty nie posiadają wag (mogą w </a:t>
+            </a:r>
+            <a:r>
+              <a:rPr lang="pl-PL" b="0" i="1" dirty="0" err="1">
+                <a:solidFill>
+                  <a:srgbClr val="333333"/>
+                </a:solidFill>
+                <a:effectLst/>
+                <a:latin typeface="inherit"/>
+              </a:rPr>
+              <a:t>highway</a:t>
+            </a:r>
+            <a:r>
+              <a:rPr lang="pl-PL" b="0" i="1" dirty="0">
+                <a:solidFill>
+                  <a:srgbClr val="333333"/>
+                </a:solidFill>
+                <a:effectLst/>
+                <a:latin typeface="inherit"/>
+              </a:rPr>
+              <a:t> network</a:t>
+            </a:r>
+            <a:r>
+              <a:rPr lang="pl-PL" b="0" i="0" dirty="0">
+                <a:solidFill>
+                  <a:srgbClr val="333333"/>
+                </a:solidFill>
+                <a:effectLst/>
+                <a:latin typeface="EB Garamond" panose="00000500000000000000" pitchFamily="2" charset="0"/>
+              </a:rPr>
+              <a:t>)</a:t>
+            </a:r>
+          </a:p>
+          <a:p>
+            <a:endParaRPr lang="pl-PL" dirty="0"/>
+          </a:p>
+        </p:txBody>
+      </p:sp>
+    </p:spTree>
+    <p:extLst>
+      <p:ext uri="{BB962C8B-B14F-4D97-AF65-F5344CB8AC3E}">
+        <p14:creationId xmlns:p14="http://schemas.microsoft.com/office/powerpoint/2010/main" val="2594826386"/>
+      </p:ext>
+    </p:extLst>
+  </p:cSld>
+  <p:clrMapOvr>
+    <a:masterClrMapping/>
+  </p:clrMapOvr>
+</p:sld>
+</file>
+
+<file path=ppt/slides/slide14.xml><?xml version="1.0" encoding="utf-8"?>
+<p:sld xmlns:a="http://schemas.openxmlformats.org/drawingml/2006/main" xmlns:r="http://schemas.openxmlformats.org/officeDocument/2006/relationships" xmlns:p="http://schemas.openxmlformats.org/presentationml/2006/main">
+  <p:cSld>
+    <p:spTree>
+      <p:nvGrpSpPr>
+        <p:cNvPr id="1" name=""/>
+        <p:cNvGrpSpPr/>
+        <p:nvPr/>
+      </p:nvGrpSpPr>
+      <p:grpSpPr>
+        <a:xfrm>
+          <a:off x="0" y="0"/>
+          <a:ext cx="0" cy="0"/>
+          <a:chOff x="0" y="0"/>
+          <a:chExt cx="0" cy="0"/>
+        </a:xfrm>
+      </p:grpSpPr>
+      <p:sp>
+        <p:nvSpPr>
+          <p:cNvPr id="2" name="Tytuł 1">
+            <a:extLst>
+              <a:ext uri="{FF2B5EF4-FFF2-40B4-BE49-F238E27FC236}">
+                <a16:creationId xmlns:a16="http://schemas.microsoft.com/office/drawing/2014/main" id="{5165E581-9BBC-277E-6F5B-DCB58B3D3518}"/>
+              </a:ext>
+            </a:extLst>
+          </p:cNvPr>
+          <p:cNvSpPr>
+            <a:spLocks noGrp="1"/>
+          </p:cNvSpPr>
+          <p:nvPr>
+            <p:ph type="title"/>
+          </p:nvPr>
+        </p:nvSpPr>
+        <p:spPr/>
+        <p:txBody>
+          <a:bodyPr/>
+          <a:lstStyle/>
+          <a:p>
+            <a:endParaRPr lang="pl-PL"/>
+          </a:p>
+        </p:txBody>
+      </p:sp>
+      <p:sp>
+        <p:nvSpPr>
+          <p:cNvPr id="4" name="Rectangle 1">
+            <a:extLst>
+              <a:ext uri="{FF2B5EF4-FFF2-40B4-BE49-F238E27FC236}">
+                <a16:creationId xmlns:a16="http://schemas.microsoft.com/office/drawing/2014/main" id="{1D9D1DB9-4E74-BC89-BE13-CB1957BABC54}"/>
+              </a:ext>
+            </a:extLst>
+          </p:cNvPr>
+          <p:cNvSpPr>
+            <a:spLocks noGrp="1" noChangeArrowheads="1"/>
+          </p:cNvSpPr>
+          <p:nvPr>
+            <p:ph idx="1"/>
+          </p:nvPr>
+        </p:nvSpPr>
+        <p:spPr bwMode="auto">
+          <a:prstGeom prst="rect">
+            <a:avLst/>
+          </a:prstGeom>
+          <a:solidFill>
+            <a:srgbClr val="F7F3DE"/>
+          </a:solidFill>
+          <a:ln>
+            <a:noFill/>
+          </a:ln>
+          <a:effectLst/>
+          <a:extLst>
+            <a:ext uri="{91240B29-F687-4F45-9708-019B960494DF}">
+              <a14:hiddenLine xmlns:a14="http://schemas.microsoft.com/office/drawing/2010/main" w="9525">
+                <a:solidFill>
+                  <a:schemeClr val="tx1"/>
+                </a:solidFill>
+                <a:miter lim="800000"/>
+                <a:headEnd/>
+                <a:tailEnd/>
+              </a14:hiddenLine>
+            </a:ext>
+            <a:ext uri="{AF507438-7753-43E0-B8FC-AC1667EBCBE1}">
+              <a14:hiddenEffects xmlns:a14="http://schemas.microsoft.com/office/drawing/2010/main">
+                <a:effectLst>
+                  <a:outerShdw dist="35921" dir="2700000" algn="ctr" rotWithShape="0">
+                    <a:schemeClr val="bg2"/>
+                  </a:outerShdw>
+                </a:effectLst>
+              </a14:hiddenEffects>
+            </a:ext>
+          </a:extLst>
+        </p:spPr>
+        <p:txBody>
+          <a:bodyPr vert="horz" wrap="none" lIns="0" tIns="0" rIns="0" bIns="0" numCol="1" anchor="ctr" anchorCtr="0" compatLnSpc="1">
+            <a:prstTxWarp prst="textNoShape">
+              <a:avLst/>
+            </a:prstTxWarp>
+            <a:spAutoFit/>
+          </a:bodyPr>
+          <a:lstStyle>
+            <a:lvl1pPr eaLnBrk="0" fontAlgn="base" hangingPunct="0">
+              <a:spcBef>
+                <a:spcPct val="0"/>
+              </a:spcBef>
+              <a:spcAft>
+                <a:spcPct val="0"/>
+              </a:spcAft>
+              <a:defRPr>
+                <a:solidFill>
+                  <a:schemeClr val="tx1"/>
+                </a:solidFill>
+                <a:latin typeface="Arial" panose="020B0604020202020204" pitchFamily="34" charset="0"/>
+              </a:defRPr>
+            </a:lvl1pPr>
+            <a:lvl2pPr eaLnBrk="0" fontAlgn="base" hangingPunct="0">
+              <a:spcBef>
+                <a:spcPct val="0"/>
+              </a:spcBef>
+              <a:spcAft>
+                <a:spcPct val="0"/>
+              </a:spcAft>
+              <a:defRPr>
+                <a:solidFill>
+                  <a:schemeClr val="tx1"/>
+                </a:solidFill>
+                <a:latin typeface="Arial" panose="020B0604020202020204" pitchFamily="34" charset="0"/>
+              </a:defRPr>
+            </a:lvl2pPr>
+            <a:lvl3pPr eaLnBrk="0" fontAlgn="base" hangingPunct="0">
+              <a:spcBef>
+                <a:spcPct val="0"/>
+              </a:spcBef>
+              <a:spcAft>
+                <a:spcPct val="0"/>
+              </a:spcAft>
+              <a:defRPr>
+                <a:solidFill>
+                  <a:schemeClr val="tx1"/>
+                </a:solidFill>
+                <a:latin typeface="Arial" panose="020B0604020202020204" pitchFamily="34" charset="0"/>
+              </a:defRPr>
+            </a:lvl3pPr>
+            <a:lvl4pPr eaLnBrk="0" fontAlgn="base" hangingPunct="0">
+              <a:spcBef>
+                <a:spcPct val="0"/>
+              </a:spcBef>
+              <a:spcAft>
+                <a:spcPct val="0"/>
+              </a:spcAft>
+              <a:defRPr>
+                <a:solidFill>
+                  <a:schemeClr val="tx1"/>
+                </a:solidFill>
+                <a:latin typeface="Arial" panose="020B0604020202020204" pitchFamily="34" charset="0"/>
+              </a:defRPr>
+            </a:lvl4pPr>
+            <a:lvl5pPr eaLnBrk="0" fontAlgn="base" hangingPunct="0">
+              <a:spcBef>
+                <a:spcPct val="0"/>
+              </a:spcBef>
+              <a:spcAft>
+                <a:spcPct val="0"/>
+              </a:spcAft>
+              <a:defRPr>
+                <a:solidFill>
+                  <a:schemeClr val="tx1"/>
+                </a:solidFill>
+                <a:latin typeface="Arial" panose="020B0604020202020204" pitchFamily="34" charset="0"/>
+              </a:defRPr>
+            </a:lvl5pPr>
+            <a:lvl6pPr eaLnBrk="0" fontAlgn="base" hangingPunct="0">
+              <a:spcBef>
+                <a:spcPct val="0"/>
+              </a:spcBef>
+              <a:spcAft>
+                <a:spcPct val="0"/>
+              </a:spcAft>
+              <a:defRPr>
+                <a:solidFill>
+                  <a:schemeClr val="tx1"/>
+                </a:solidFill>
+                <a:latin typeface="Arial" panose="020B0604020202020204" pitchFamily="34" charset="0"/>
+              </a:defRPr>
+            </a:lvl6pPr>
+            <a:lvl7pPr eaLnBrk="0" fontAlgn="base" hangingPunct="0">
+              <a:spcBef>
+                <a:spcPct val="0"/>
+              </a:spcBef>
+              <a:spcAft>
+                <a:spcPct val="0"/>
+              </a:spcAft>
+              <a:defRPr>
+                <a:solidFill>
+                  <a:schemeClr val="tx1"/>
+                </a:solidFill>
+                <a:latin typeface="Arial" panose="020B0604020202020204" pitchFamily="34" charset="0"/>
+              </a:defRPr>
+            </a:lvl7pPr>
+            <a:lvl8pPr eaLnBrk="0" fontAlgn="base" hangingPunct="0">
+              <a:spcBef>
+                <a:spcPct val="0"/>
+              </a:spcBef>
+              <a:spcAft>
+                <a:spcPct val="0"/>
+              </a:spcAft>
+              <a:defRPr>
+                <a:solidFill>
+                  <a:schemeClr val="tx1"/>
+                </a:solidFill>
+                <a:latin typeface="Arial" panose="020B0604020202020204" pitchFamily="34" charset="0"/>
+              </a:defRPr>
+            </a:lvl8pPr>
+            <a:lvl9pPr eaLnBrk="0" fontAlgn="base" hangingPunct="0">
+              <a:spcBef>
+                <a:spcPct val="0"/>
+              </a:spcBef>
+              <a:spcAft>
+                <a:spcPct val="0"/>
+              </a:spcAft>
+              <a:defRPr>
+                <a:solidFill>
+                  <a:schemeClr val="tx1"/>
+                </a:solidFill>
+                <a:latin typeface="Arial" panose="020B0604020202020204" pitchFamily="34" charset="0"/>
+              </a:defRPr>
+            </a:lvl9pPr>
+          </a:lstStyle>
+          <a:p>
+            <a:pPr marL="0" marR="0" lvl="0" indent="0" algn="l" defTabSz="914400" rtl="0" eaLnBrk="0" fontAlgn="base" latinLnBrk="0" hangingPunct="0">
+              <a:lnSpc>
+                <a:spcPct val="100000"/>
+              </a:lnSpc>
+              <a:spcBef>
+                <a:spcPct val="0"/>
+              </a:spcBef>
+              <a:spcAft>
+                <a:spcPct val="0"/>
+              </a:spcAft>
+              <a:buClrTx/>
+              <a:buSzTx/>
+              <a:buFontTx/>
+              <a:buNone/>
+              <a:tabLst/>
+            </a:pPr>
+            <a:r>
+              <a:rPr kumimoji="0" lang="pl-PL" altLang="pl-PL" sz="21600" b="1" i="0" u="none" strike="noStrike" cap="none" normalizeH="0" baseline="0">
+                <a:ln>
+                  <a:noFill/>
+                </a:ln>
+                <a:solidFill>
+                  <a:srgbClr val="FF8C00"/>
+                </a:solidFill>
+                <a:effectLst/>
+                <a:latin typeface="Raleway" pitchFamily="2" charset="-18"/>
+              </a:rPr>
+              <a:t>Zasada działania ResNet</a:t>
+            </a:r>
+          </a:p>
+          <a:p>
+            <a:pPr marL="0" marR="0" lvl="0" indent="0" algn="l" defTabSz="914400" rtl="0" eaLnBrk="0" fontAlgn="base" latinLnBrk="0" hangingPunct="0">
+              <a:lnSpc>
+                <a:spcPct val="100000"/>
+              </a:lnSpc>
+              <a:spcBef>
+                <a:spcPct val="0"/>
+              </a:spcBef>
+              <a:spcAft>
+                <a:spcPct val="0"/>
+              </a:spcAft>
+              <a:buClrTx/>
+              <a:buSzTx/>
+              <a:buFontTx/>
+              <a:buChar char="•"/>
+              <a:tabLst/>
+            </a:pPr>
+            <a:r>
+              <a:rPr kumimoji="0" lang="pl-PL" altLang="pl-PL" sz="3600" b="1" i="0" u="none" strike="noStrike" cap="none" normalizeH="0" baseline="0">
+                <a:ln>
+                  <a:noFill/>
+                </a:ln>
+                <a:solidFill>
+                  <a:srgbClr val="333333"/>
+                </a:solidFill>
+                <a:effectLst/>
+                <a:latin typeface="inherit"/>
+              </a:rPr>
+              <a:t>założenie:</a:t>
+            </a:r>
+            <a:r>
+              <a:rPr kumimoji="0" lang="pl-PL" altLang="pl-PL" sz="3600" b="0" i="0" u="none" strike="noStrike" cap="none" normalizeH="0" baseline="0">
+                <a:ln>
+                  <a:noFill/>
+                </a:ln>
+                <a:solidFill>
+                  <a:srgbClr val="333333"/>
+                </a:solidFill>
+                <a:effectLst/>
+                <a:latin typeface="EB Garamond" panose="00000500000000000000" pitchFamily="2" charset="0"/>
+              </a:rPr>
+              <a:t> odwzorowanie </a:t>
+            </a:r>
+            <a:r>
+              <a:rPr kumimoji="0" lang="pl-PL" altLang="pl-PL" sz="3600" b="0" i="0" u="none" strike="noStrike" cap="none" normalizeH="0" baseline="0">
+                <a:ln>
+                  <a:noFill/>
+                </a:ln>
+                <a:solidFill>
+                  <a:srgbClr val="333333"/>
+                </a:solidFill>
+                <a:effectLst/>
+                <a:latin typeface="MathJax_Math-italic"/>
+              </a:rPr>
+              <a:t>H</a:t>
+            </a:r>
+            <a:r>
+              <a:rPr kumimoji="0" lang="pl-PL" altLang="pl-PL" sz="3600" b="0" i="0" u="none" strike="noStrike" cap="none" normalizeH="0" baseline="0">
+                <a:ln>
+                  <a:noFill/>
+                </a:ln>
+                <a:solidFill>
+                  <a:srgbClr val="333333"/>
+                </a:solidFill>
+                <a:effectLst/>
+                <a:latin typeface="MathJax_Main"/>
+              </a:rPr>
+              <a:t>(</a:t>
+            </a:r>
+            <a:r>
+              <a:rPr kumimoji="0" lang="pl-PL" altLang="pl-PL" sz="3600" b="0" i="0" u="none" strike="noStrike" cap="none" normalizeH="0" baseline="0">
+                <a:ln>
+                  <a:noFill/>
+                </a:ln>
+                <a:solidFill>
+                  <a:srgbClr val="333333"/>
+                </a:solidFill>
+                <a:effectLst/>
+                <a:latin typeface="MathJax_Math-italic"/>
+              </a:rPr>
+              <a:t>x</a:t>
+            </a:r>
+            <a:r>
+              <a:rPr kumimoji="0" lang="pl-PL" altLang="pl-PL" sz="3600" b="0" i="0" u="none" strike="noStrike" cap="none" normalizeH="0" baseline="0">
+                <a:ln>
+                  <a:noFill/>
+                </a:ln>
+                <a:solidFill>
+                  <a:srgbClr val="333333"/>
+                </a:solidFill>
+                <a:effectLst/>
+                <a:latin typeface="MathJax_Main"/>
+              </a:rPr>
+              <a:t>⃗ )</a:t>
+            </a:r>
+            <a:r>
+              <a:rPr kumimoji="0" lang="pl-PL" altLang="pl-PL" sz="3600" b="0" i="0" u="none" strike="noStrike" cap="none" normalizeH="0" baseline="0">
+                <a:ln>
+                  <a:noFill/>
+                </a:ln>
+                <a:solidFill>
+                  <a:srgbClr val="333333"/>
+                </a:solidFill>
+                <a:effectLst/>
+                <a:latin typeface="inherit"/>
+              </a:rPr>
+              <a:t>H(x→)</a:t>
+            </a:r>
+            <a:r>
+              <a:rPr kumimoji="0" lang="pl-PL" altLang="pl-PL" sz="3600" b="0" i="0" u="none" strike="noStrike" cap="none" normalizeH="0" baseline="0">
+                <a:ln>
+                  <a:noFill/>
+                </a:ln>
+                <a:solidFill>
+                  <a:srgbClr val="333333"/>
+                </a:solidFill>
+                <a:effectLst/>
+                <a:latin typeface="EB Garamond" panose="00000500000000000000" pitchFamily="2" charset="0"/>
+              </a:rPr>
+              <a:t> może być aproksymowane przez szereg przekształceń (warstw) nieliniowych</a:t>
+            </a:r>
+          </a:p>
+          <a:p>
+            <a:pPr marL="0" marR="0" lvl="0" indent="0" algn="l" defTabSz="914400" rtl="0" eaLnBrk="0" fontAlgn="base" latinLnBrk="0" hangingPunct="0">
+              <a:lnSpc>
+                <a:spcPct val="100000"/>
+              </a:lnSpc>
+              <a:spcBef>
+                <a:spcPct val="0"/>
+              </a:spcBef>
+              <a:spcAft>
+                <a:spcPct val="0"/>
+              </a:spcAft>
+              <a:buClrTx/>
+              <a:buSzTx/>
+              <a:buFontTx/>
+              <a:buChar char="•"/>
+              <a:tabLst/>
+            </a:pPr>
+            <a:r>
+              <a:rPr kumimoji="0" lang="pl-PL" altLang="pl-PL" sz="3600" b="1" i="0" u="none" strike="noStrike" cap="none" normalizeH="0" baseline="0">
+                <a:ln>
+                  <a:noFill/>
+                </a:ln>
+                <a:solidFill>
+                  <a:srgbClr val="333333"/>
+                </a:solidFill>
+                <a:effectLst/>
+                <a:latin typeface="inherit"/>
+              </a:rPr>
+              <a:t>teza:</a:t>
+            </a:r>
+            <a:r>
+              <a:rPr kumimoji="0" lang="pl-PL" altLang="pl-PL" sz="3600" b="0" i="0" u="none" strike="noStrike" cap="none" normalizeH="0" baseline="0">
+                <a:ln>
+                  <a:noFill/>
+                </a:ln>
+                <a:solidFill>
+                  <a:srgbClr val="333333"/>
+                </a:solidFill>
+                <a:effectLst/>
+                <a:latin typeface="EB Garamond" panose="00000500000000000000" pitchFamily="2" charset="0"/>
+              </a:rPr>
+              <a:t> możliwa jest aproksymacja reszty (residuum) </a:t>
+            </a:r>
+            <a:r>
+              <a:rPr kumimoji="0" lang="pl-PL" altLang="pl-PL" sz="3600" b="0" i="0" u="none" strike="noStrike" cap="none" normalizeH="0" baseline="0">
+                <a:ln>
+                  <a:noFill/>
+                </a:ln>
+                <a:solidFill>
+                  <a:srgbClr val="333333"/>
+                </a:solidFill>
+                <a:effectLst/>
+                <a:latin typeface="MathJax_Math-italic"/>
+              </a:rPr>
+              <a:t>F</a:t>
+            </a:r>
+            <a:r>
+              <a:rPr kumimoji="0" lang="pl-PL" altLang="pl-PL" sz="3600" b="0" i="0" u="none" strike="noStrike" cap="none" normalizeH="0" baseline="0">
+                <a:ln>
+                  <a:noFill/>
+                </a:ln>
+                <a:solidFill>
+                  <a:srgbClr val="333333"/>
+                </a:solidFill>
+                <a:effectLst/>
+                <a:latin typeface="MathJax_Main"/>
+              </a:rPr>
+              <a:t>(</a:t>
+            </a:r>
+            <a:r>
+              <a:rPr kumimoji="0" lang="pl-PL" altLang="pl-PL" sz="3600" b="0" i="0" u="none" strike="noStrike" cap="none" normalizeH="0" baseline="0">
+                <a:ln>
+                  <a:noFill/>
+                </a:ln>
+                <a:solidFill>
+                  <a:srgbClr val="333333"/>
+                </a:solidFill>
+                <a:effectLst/>
+                <a:latin typeface="MathJax_Math-italic"/>
+              </a:rPr>
+              <a:t>x</a:t>
+            </a:r>
+            <a:r>
+              <a:rPr kumimoji="0" lang="pl-PL" altLang="pl-PL" sz="3600" b="0" i="0" u="none" strike="noStrike" cap="none" normalizeH="0" baseline="0">
+                <a:ln>
+                  <a:noFill/>
+                </a:ln>
+                <a:solidFill>
+                  <a:srgbClr val="333333"/>
+                </a:solidFill>
+                <a:effectLst/>
+                <a:latin typeface="MathJax_Main"/>
+              </a:rPr>
+              <a:t>⃗ )=</a:t>
+            </a:r>
+            <a:r>
+              <a:rPr kumimoji="0" lang="pl-PL" altLang="pl-PL" sz="3600" b="0" i="0" u="none" strike="noStrike" cap="none" normalizeH="0" baseline="0">
+                <a:ln>
+                  <a:noFill/>
+                </a:ln>
+                <a:solidFill>
+                  <a:srgbClr val="333333"/>
+                </a:solidFill>
+                <a:effectLst/>
+                <a:latin typeface="MathJax_Math-italic"/>
+              </a:rPr>
+              <a:t>H</a:t>
+            </a:r>
+            <a:r>
+              <a:rPr kumimoji="0" lang="pl-PL" altLang="pl-PL" sz="3600" b="0" i="0" u="none" strike="noStrike" cap="none" normalizeH="0" baseline="0">
+                <a:ln>
+                  <a:noFill/>
+                </a:ln>
+                <a:solidFill>
+                  <a:srgbClr val="333333"/>
+                </a:solidFill>
+                <a:effectLst/>
+                <a:latin typeface="MathJax_Main"/>
+              </a:rPr>
+              <a:t>(</a:t>
+            </a:r>
+            <a:r>
+              <a:rPr kumimoji="0" lang="pl-PL" altLang="pl-PL" sz="3600" b="0" i="0" u="none" strike="noStrike" cap="none" normalizeH="0" baseline="0">
+                <a:ln>
+                  <a:noFill/>
+                </a:ln>
+                <a:solidFill>
+                  <a:srgbClr val="333333"/>
+                </a:solidFill>
+                <a:effectLst/>
+                <a:latin typeface="MathJax_Math-italic"/>
+              </a:rPr>
+              <a:t>x</a:t>
+            </a:r>
+            <a:r>
+              <a:rPr kumimoji="0" lang="pl-PL" altLang="pl-PL" sz="3600" b="0" i="0" u="none" strike="noStrike" cap="none" normalizeH="0" baseline="0">
+                <a:ln>
+                  <a:noFill/>
+                </a:ln>
+                <a:solidFill>
+                  <a:srgbClr val="333333"/>
+                </a:solidFill>
+                <a:effectLst/>
+                <a:latin typeface="MathJax_Main"/>
+              </a:rPr>
+              <a:t>⃗ )−</a:t>
+            </a:r>
+            <a:r>
+              <a:rPr kumimoji="0" lang="pl-PL" altLang="pl-PL" sz="3600" b="0" i="0" u="none" strike="noStrike" cap="none" normalizeH="0" baseline="0">
+                <a:ln>
+                  <a:noFill/>
+                </a:ln>
+                <a:solidFill>
+                  <a:srgbClr val="333333"/>
+                </a:solidFill>
+                <a:effectLst/>
+                <a:latin typeface="MathJax_Math-italic"/>
+              </a:rPr>
+              <a:t>x</a:t>
+            </a:r>
+            <a:r>
+              <a:rPr kumimoji="0" lang="pl-PL" altLang="pl-PL" sz="3600" b="0" i="0" u="none" strike="noStrike" cap="none" normalizeH="0" baseline="0">
+                <a:ln>
+                  <a:noFill/>
+                </a:ln>
+                <a:solidFill>
+                  <a:srgbClr val="333333"/>
+                </a:solidFill>
+                <a:effectLst/>
+                <a:latin typeface="MathJax_Main"/>
+              </a:rPr>
+              <a:t>⃗ </a:t>
+            </a:r>
+            <a:r>
+              <a:rPr kumimoji="0" lang="pl-PL" altLang="pl-PL" sz="3600" b="0" i="0" u="none" strike="noStrike" cap="none" normalizeH="0" baseline="0">
+                <a:ln>
+                  <a:noFill/>
+                </a:ln>
+                <a:solidFill>
+                  <a:srgbClr val="333333"/>
+                </a:solidFill>
+                <a:effectLst/>
+                <a:latin typeface="inherit"/>
+              </a:rPr>
+              <a:t>F(x→)=H(x→)−x→</a:t>
+            </a:r>
+            <a:endParaRPr kumimoji="0" lang="pl-PL" altLang="pl-PL" sz="3600" b="0" i="0" u="none" strike="noStrike" cap="none" normalizeH="0" baseline="0">
+              <a:ln>
+                <a:noFill/>
+              </a:ln>
+              <a:solidFill>
+                <a:srgbClr val="333333"/>
+              </a:solidFill>
+              <a:effectLst/>
+              <a:latin typeface="EB Garamond" panose="00000500000000000000" pitchFamily="2" charset="0"/>
+            </a:endParaRPr>
+          </a:p>
+          <a:p>
+            <a:pPr marL="0" marR="0" lvl="0" indent="0" algn="l" defTabSz="914400" rtl="0" eaLnBrk="0" fontAlgn="base" latinLnBrk="0" hangingPunct="0">
+              <a:lnSpc>
+                <a:spcPct val="100000"/>
+              </a:lnSpc>
+              <a:spcBef>
+                <a:spcPct val="0"/>
+              </a:spcBef>
+              <a:spcAft>
+                <a:spcPct val="0"/>
+              </a:spcAft>
+              <a:buClrTx/>
+              <a:buSzTx/>
+              <a:buFontTx/>
+              <a:buChar char="•"/>
+              <a:tabLst/>
+            </a:pPr>
+            <a:r>
+              <a:rPr kumimoji="0" lang="pl-PL" altLang="pl-PL" sz="3600" b="1" i="0" u="none" strike="noStrike" cap="none" normalizeH="0" baseline="0">
+                <a:ln>
+                  <a:noFill/>
+                </a:ln>
+                <a:solidFill>
+                  <a:srgbClr val="333333"/>
+                </a:solidFill>
+                <a:effectLst/>
+                <a:latin typeface="inherit"/>
+              </a:rPr>
+              <a:t>obserwacja:</a:t>
+            </a:r>
+            <a:r>
+              <a:rPr kumimoji="0" lang="pl-PL" altLang="pl-PL" sz="3600" b="0" i="0" u="none" strike="noStrike" cap="none" normalizeH="0" baseline="0">
+                <a:ln>
+                  <a:noFill/>
+                </a:ln>
+                <a:solidFill>
+                  <a:srgbClr val="333333"/>
+                </a:solidFill>
+                <a:effectLst/>
+                <a:latin typeface="EB Garamond" panose="00000500000000000000" pitchFamily="2" charset="0"/>
+              </a:rPr>
+              <a:t> algorytmom łatwiej jest znaleźć residuum </a:t>
+            </a:r>
+            <a:r>
+              <a:rPr kumimoji="0" lang="pl-PL" altLang="pl-PL" sz="3600" b="0" i="0" u="none" strike="noStrike" cap="none" normalizeH="0" baseline="0">
+                <a:ln>
+                  <a:noFill/>
+                </a:ln>
+                <a:solidFill>
+                  <a:srgbClr val="333333"/>
+                </a:solidFill>
+                <a:effectLst/>
+                <a:latin typeface="MathJax_Math-italic"/>
+              </a:rPr>
+              <a:t>F</a:t>
+            </a:r>
+            <a:r>
+              <a:rPr kumimoji="0" lang="pl-PL" altLang="pl-PL" sz="3600" b="0" i="0" u="none" strike="noStrike" cap="none" normalizeH="0" baseline="0">
+                <a:ln>
+                  <a:noFill/>
+                </a:ln>
+                <a:solidFill>
+                  <a:srgbClr val="333333"/>
+                </a:solidFill>
+                <a:effectLst/>
+                <a:latin typeface="MathJax_Main"/>
+              </a:rPr>
+              <a:t>(</a:t>
+            </a:r>
+            <a:r>
+              <a:rPr kumimoji="0" lang="pl-PL" altLang="pl-PL" sz="3600" b="0" i="0" u="none" strike="noStrike" cap="none" normalizeH="0" baseline="0">
+                <a:ln>
+                  <a:noFill/>
+                </a:ln>
+                <a:solidFill>
+                  <a:srgbClr val="333333"/>
+                </a:solidFill>
+                <a:effectLst/>
+                <a:latin typeface="MathJax_Math-italic"/>
+              </a:rPr>
+              <a:t>x</a:t>
+            </a:r>
+            <a:r>
+              <a:rPr kumimoji="0" lang="pl-PL" altLang="pl-PL" sz="3600" b="0" i="0" u="none" strike="noStrike" cap="none" normalizeH="0" baseline="0">
+                <a:ln>
+                  <a:noFill/>
+                </a:ln>
+                <a:solidFill>
+                  <a:srgbClr val="333333"/>
+                </a:solidFill>
+                <a:effectLst/>
+                <a:latin typeface="MathJax_Main"/>
+              </a:rPr>
+              <a:t>⃗ )</a:t>
+            </a:r>
+            <a:r>
+              <a:rPr kumimoji="0" lang="pl-PL" altLang="pl-PL" sz="3600" b="0" i="0" u="none" strike="noStrike" cap="none" normalizeH="0" baseline="0">
+                <a:ln>
+                  <a:noFill/>
+                </a:ln>
+                <a:solidFill>
+                  <a:srgbClr val="333333"/>
+                </a:solidFill>
+                <a:effectLst/>
+                <a:latin typeface="inherit"/>
+              </a:rPr>
+              <a:t>F(x→)</a:t>
+            </a:r>
+            <a:r>
+              <a:rPr kumimoji="0" lang="pl-PL" altLang="pl-PL" sz="3600" b="0" i="0" u="none" strike="noStrike" cap="none" normalizeH="0" baseline="0">
+                <a:ln>
+                  <a:noFill/>
+                </a:ln>
+                <a:solidFill>
+                  <a:srgbClr val="333333"/>
+                </a:solidFill>
+                <a:effectLst/>
+                <a:latin typeface="EB Garamond" panose="00000500000000000000" pitchFamily="2" charset="0"/>
+              </a:rPr>
+              <a:t>, niż funkcję </a:t>
+            </a:r>
+            <a:r>
+              <a:rPr kumimoji="0" lang="pl-PL" altLang="pl-PL" sz="3600" b="0" i="0" u="none" strike="noStrike" cap="none" normalizeH="0" baseline="0">
+                <a:ln>
+                  <a:noFill/>
+                </a:ln>
+                <a:solidFill>
+                  <a:srgbClr val="333333"/>
+                </a:solidFill>
+                <a:effectLst/>
+                <a:latin typeface="MathJax_Math-italic"/>
+              </a:rPr>
+              <a:t>H</a:t>
+            </a:r>
+            <a:r>
+              <a:rPr kumimoji="0" lang="pl-PL" altLang="pl-PL" sz="3600" b="0" i="0" u="none" strike="noStrike" cap="none" normalizeH="0" baseline="0">
+                <a:ln>
+                  <a:noFill/>
+                </a:ln>
+                <a:solidFill>
+                  <a:srgbClr val="333333"/>
+                </a:solidFill>
+                <a:effectLst/>
+                <a:latin typeface="MathJax_Main"/>
+              </a:rPr>
+              <a:t>(</a:t>
+            </a:r>
+            <a:r>
+              <a:rPr kumimoji="0" lang="pl-PL" altLang="pl-PL" sz="3600" b="0" i="0" u="none" strike="noStrike" cap="none" normalizeH="0" baseline="0">
+                <a:ln>
+                  <a:noFill/>
+                </a:ln>
+                <a:solidFill>
+                  <a:srgbClr val="333333"/>
+                </a:solidFill>
+                <a:effectLst/>
+                <a:latin typeface="MathJax_Math-italic"/>
+              </a:rPr>
+              <a:t>x</a:t>
+            </a:r>
+            <a:r>
+              <a:rPr kumimoji="0" lang="pl-PL" altLang="pl-PL" sz="3600" b="0" i="0" u="none" strike="noStrike" cap="none" normalizeH="0" baseline="0">
+                <a:ln>
+                  <a:noFill/>
+                </a:ln>
+                <a:solidFill>
+                  <a:srgbClr val="333333"/>
+                </a:solidFill>
+                <a:effectLst/>
+                <a:latin typeface="MathJax_Main"/>
+              </a:rPr>
+              <a:t>⃗ )</a:t>
+            </a:r>
+            <a:r>
+              <a:rPr kumimoji="0" lang="pl-PL" altLang="pl-PL" sz="3600" b="0" i="0" u="none" strike="noStrike" cap="none" normalizeH="0" baseline="0">
+                <a:ln>
+                  <a:noFill/>
+                </a:ln>
+                <a:solidFill>
+                  <a:srgbClr val="333333"/>
+                </a:solidFill>
+                <a:effectLst/>
+                <a:latin typeface="inherit"/>
+              </a:rPr>
+              <a:t>H(x→)</a:t>
+            </a:r>
+            <a:endParaRPr kumimoji="0" lang="pl-PL" altLang="pl-PL" sz="3600" b="0" i="0" u="none" strike="noStrike" cap="none" normalizeH="0" baseline="0">
+              <a:ln>
+                <a:noFill/>
+              </a:ln>
+              <a:solidFill>
+                <a:srgbClr val="333333"/>
+              </a:solidFill>
+              <a:effectLst/>
+              <a:latin typeface="EB Garamond" panose="00000500000000000000" pitchFamily="2" charset="0"/>
+            </a:endParaRPr>
+          </a:p>
+          <a:p>
+            <a:pPr marL="0" marR="0" lvl="0" indent="0" algn="l" defTabSz="914400" rtl="0" eaLnBrk="0" fontAlgn="base" latinLnBrk="0" hangingPunct="0">
+              <a:lnSpc>
+                <a:spcPct val="100000"/>
+              </a:lnSpc>
+              <a:spcBef>
+                <a:spcPct val="0"/>
+              </a:spcBef>
+              <a:spcAft>
+                <a:spcPct val="0"/>
+              </a:spcAft>
+              <a:buClrTx/>
+              <a:buSzTx/>
+              <a:buFontTx/>
+              <a:buChar char="•"/>
+              <a:tabLst/>
+            </a:pPr>
+            <a:r>
+              <a:rPr kumimoji="0" lang="pl-PL" altLang="pl-PL" sz="3600" b="0" i="0" u="none" strike="noStrike" cap="none" normalizeH="0" baseline="0">
+                <a:ln>
+                  <a:noFill/>
+                </a:ln>
+                <a:solidFill>
+                  <a:srgbClr val="333333"/>
+                </a:solidFill>
+                <a:effectLst/>
+                <a:latin typeface="EB Garamond" panose="00000500000000000000" pitchFamily="2" charset="0"/>
+              </a:rPr>
+              <a:t>skrót przekazuje niezmieniony sygnał, oznacza więc </a:t>
+            </a:r>
+            <a:r>
+              <a:rPr kumimoji="0" lang="pl-PL" altLang="pl-PL" sz="3600" b="1" i="0" u="none" strike="noStrike" cap="none" normalizeH="0" baseline="0">
+                <a:ln>
+                  <a:noFill/>
+                </a:ln>
+                <a:solidFill>
+                  <a:srgbClr val="333333"/>
+                </a:solidFill>
+                <a:effectLst/>
+                <a:latin typeface="inherit"/>
+              </a:rPr>
+              <a:t>odwzorowanie tożsamościowe</a:t>
+            </a:r>
+            <a:endParaRPr kumimoji="0" lang="pl-PL" altLang="pl-PL" sz="3600" b="0" i="0" u="none" strike="noStrike" cap="none" normalizeH="0" baseline="0">
+              <a:ln>
+                <a:noFill/>
+              </a:ln>
+              <a:solidFill>
+                <a:srgbClr val="333333"/>
+              </a:solidFill>
+              <a:effectLst/>
+              <a:latin typeface="EB Garamond" panose="00000500000000000000" pitchFamily="2" charset="0"/>
+            </a:endParaRPr>
+          </a:p>
+          <a:p>
+            <a:pPr marL="0" marR="0" lvl="0" indent="0" algn="l" defTabSz="914400" rtl="0" eaLnBrk="0" fontAlgn="base" latinLnBrk="0" hangingPunct="0">
+              <a:lnSpc>
+                <a:spcPct val="100000"/>
+              </a:lnSpc>
+              <a:spcBef>
+                <a:spcPct val="0"/>
+              </a:spcBef>
+              <a:spcAft>
+                <a:spcPct val="0"/>
+              </a:spcAft>
+              <a:buClrTx/>
+              <a:buSzTx/>
+              <a:buFontTx/>
+              <a:buChar char="•"/>
+              <a:tabLst/>
+            </a:pPr>
+            <a:r>
+              <a:rPr kumimoji="0" lang="pl-PL" altLang="pl-PL" sz="3600" b="0" i="0" u="none" strike="noStrike" cap="none" normalizeH="0" baseline="0">
+                <a:ln>
+                  <a:noFill/>
+                </a:ln>
+                <a:solidFill>
+                  <a:srgbClr val="333333"/>
+                </a:solidFill>
+                <a:effectLst/>
+                <a:latin typeface="EB Garamond" panose="00000500000000000000" pitchFamily="2" charset="0"/>
+              </a:rPr>
+              <a:t>oryginalny sygnał jest dodawany do wyniku działania funkcji </a:t>
+            </a:r>
+            <a:r>
+              <a:rPr kumimoji="0" lang="pl-PL" altLang="pl-PL" sz="3600" b="0" i="0" u="none" strike="noStrike" cap="none" normalizeH="0" baseline="0">
+                <a:ln>
+                  <a:noFill/>
+                </a:ln>
+                <a:solidFill>
+                  <a:srgbClr val="333333"/>
+                </a:solidFill>
+                <a:effectLst/>
+                <a:latin typeface="MathJax_Math-italic"/>
+              </a:rPr>
+              <a:t>F</a:t>
+            </a:r>
+            <a:r>
+              <a:rPr kumimoji="0" lang="pl-PL" altLang="pl-PL" sz="3600" b="0" i="0" u="none" strike="noStrike" cap="none" normalizeH="0" baseline="0">
+                <a:ln>
+                  <a:noFill/>
+                </a:ln>
+                <a:solidFill>
+                  <a:srgbClr val="333333"/>
+                </a:solidFill>
+                <a:effectLst/>
+                <a:latin typeface="MathJax_Main"/>
+              </a:rPr>
+              <a:t>(</a:t>
+            </a:r>
+            <a:r>
+              <a:rPr kumimoji="0" lang="pl-PL" altLang="pl-PL" sz="3600" b="0" i="0" u="none" strike="noStrike" cap="none" normalizeH="0" baseline="0">
+                <a:ln>
+                  <a:noFill/>
+                </a:ln>
+                <a:solidFill>
+                  <a:srgbClr val="333333"/>
+                </a:solidFill>
+                <a:effectLst/>
+                <a:latin typeface="MathJax_Math-italic"/>
+              </a:rPr>
+              <a:t>x</a:t>
+            </a:r>
+            <a:r>
+              <a:rPr kumimoji="0" lang="pl-PL" altLang="pl-PL" sz="3600" b="0" i="0" u="none" strike="noStrike" cap="none" normalizeH="0" baseline="0">
+                <a:ln>
+                  <a:noFill/>
+                </a:ln>
+                <a:solidFill>
+                  <a:srgbClr val="333333"/>
+                </a:solidFill>
+                <a:effectLst/>
+                <a:latin typeface="MathJax_Main"/>
+              </a:rPr>
+              <a:t>⃗ )</a:t>
+            </a:r>
+            <a:r>
+              <a:rPr kumimoji="0" lang="pl-PL" altLang="pl-PL" sz="3600" b="0" i="0" u="none" strike="noStrike" cap="none" normalizeH="0" baseline="0">
+                <a:ln>
+                  <a:noFill/>
+                </a:ln>
+                <a:solidFill>
+                  <a:srgbClr val="333333"/>
+                </a:solidFill>
+                <a:effectLst/>
+                <a:latin typeface="inherit"/>
+              </a:rPr>
+              <a:t>F(x→)</a:t>
+            </a:r>
+            <a:endParaRPr kumimoji="0" lang="pl-PL" altLang="pl-PL" sz="3600" b="0" i="0" u="none" strike="noStrike" cap="none" normalizeH="0" baseline="0">
+              <a:ln>
+                <a:noFill/>
+              </a:ln>
+              <a:solidFill>
+                <a:srgbClr val="333333"/>
+              </a:solidFill>
+              <a:effectLst/>
+              <a:latin typeface="EB Garamond" panose="00000500000000000000" pitchFamily="2" charset="0"/>
+            </a:endParaRPr>
+          </a:p>
+          <a:p>
+            <a:pPr marL="0" marR="0" lvl="0" indent="0" algn="l" defTabSz="914400" rtl="0" eaLnBrk="0" fontAlgn="base" latinLnBrk="0" hangingPunct="0">
+              <a:lnSpc>
+                <a:spcPct val="100000"/>
+              </a:lnSpc>
+              <a:spcBef>
+                <a:spcPct val="0"/>
+              </a:spcBef>
+              <a:spcAft>
+                <a:spcPct val="0"/>
+              </a:spcAft>
+              <a:buClrTx/>
+              <a:buSzTx/>
+              <a:buFontTx/>
+              <a:buChar char="•"/>
+              <a:tabLst/>
+            </a:pPr>
+            <a:r>
+              <a:rPr kumimoji="0" lang="pl-PL" altLang="pl-PL" sz="3600" b="0" i="0" u="none" strike="noStrike" cap="none" normalizeH="0" baseline="0">
+                <a:ln>
+                  <a:noFill/>
+                </a:ln>
+                <a:solidFill>
+                  <a:srgbClr val="333333"/>
+                </a:solidFill>
+                <a:effectLst/>
+                <a:latin typeface="EB Garamond" panose="00000500000000000000" pitchFamily="2" charset="0"/>
+              </a:rPr>
+              <a:t>jeśli </a:t>
+            </a:r>
+            <a:r>
+              <a:rPr kumimoji="0" lang="pl-PL" altLang="pl-PL" sz="3600" b="0" i="0" u="none" strike="noStrike" cap="none" normalizeH="0" baseline="0">
+                <a:ln>
+                  <a:noFill/>
+                </a:ln>
+                <a:solidFill>
+                  <a:srgbClr val="333333"/>
+                </a:solidFill>
+                <a:effectLst/>
+                <a:latin typeface="MathJax_Math-italic"/>
+              </a:rPr>
+              <a:t>F</a:t>
+            </a:r>
+            <a:r>
+              <a:rPr kumimoji="0" lang="pl-PL" altLang="pl-PL" sz="3600" b="0" i="0" u="none" strike="noStrike" cap="none" normalizeH="0" baseline="0">
+                <a:ln>
+                  <a:noFill/>
+                </a:ln>
+                <a:solidFill>
+                  <a:srgbClr val="333333"/>
+                </a:solidFill>
+                <a:effectLst/>
+                <a:latin typeface="MathJax_Main"/>
+              </a:rPr>
+              <a:t>(</a:t>
+            </a:r>
+            <a:r>
+              <a:rPr kumimoji="0" lang="pl-PL" altLang="pl-PL" sz="3600" b="0" i="0" u="none" strike="noStrike" cap="none" normalizeH="0" baseline="0">
+                <a:ln>
+                  <a:noFill/>
+                </a:ln>
+                <a:solidFill>
+                  <a:srgbClr val="333333"/>
+                </a:solidFill>
+                <a:effectLst/>
+                <a:latin typeface="MathJax_Math-italic"/>
+              </a:rPr>
+              <a:t>x</a:t>
+            </a:r>
+            <a:r>
+              <a:rPr kumimoji="0" lang="pl-PL" altLang="pl-PL" sz="3600" b="0" i="0" u="none" strike="noStrike" cap="none" normalizeH="0" baseline="0">
+                <a:ln>
+                  <a:noFill/>
+                </a:ln>
+                <a:solidFill>
+                  <a:srgbClr val="333333"/>
+                </a:solidFill>
+                <a:effectLst/>
+                <a:latin typeface="MathJax_Main"/>
+              </a:rPr>
+              <a:t>⃗ )</a:t>
+            </a:r>
+            <a:r>
+              <a:rPr kumimoji="0" lang="pl-PL" altLang="pl-PL" sz="3600" b="0" i="0" u="none" strike="noStrike" cap="none" normalizeH="0" baseline="0">
+                <a:ln>
+                  <a:noFill/>
+                </a:ln>
+                <a:solidFill>
+                  <a:srgbClr val="333333"/>
+                </a:solidFill>
+                <a:effectLst/>
+                <a:latin typeface="inherit"/>
+              </a:rPr>
+              <a:t>F(x→)</a:t>
+            </a:r>
+            <a:r>
+              <a:rPr kumimoji="0" lang="pl-PL" altLang="pl-PL" sz="3600" b="0" i="0" u="none" strike="noStrike" cap="none" normalizeH="0" baseline="0">
+                <a:ln>
+                  <a:noFill/>
+                </a:ln>
+                <a:solidFill>
+                  <a:srgbClr val="333333"/>
+                </a:solidFill>
+                <a:effectLst/>
+                <a:latin typeface="EB Garamond" panose="00000500000000000000" pitchFamily="2" charset="0"/>
+              </a:rPr>
+              <a:t> i </a:t>
+            </a:r>
+            <a:r>
+              <a:rPr kumimoji="0" lang="pl-PL" altLang="pl-PL" sz="3600" b="0" i="0" u="none" strike="noStrike" cap="none" normalizeH="0" baseline="0">
+                <a:ln>
+                  <a:noFill/>
+                </a:ln>
+                <a:solidFill>
+                  <a:srgbClr val="333333"/>
+                </a:solidFill>
+                <a:effectLst/>
+                <a:latin typeface="MathJax_Math-italic"/>
+              </a:rPr>
+              <a:t>x</a:t>
+            </a:r>
+            <a:r>
+              <a:rPr kumimoji="0" lang="pl-PL" altLang="pl-PL" sz="3600" b="0" i="0" u="none" strike="noStrike" cap="none" normalizeH="0" baseline="0">
+                <a:ln>
+                  <a:noFill/>
+                </a:ln>
+                <a:solidFill>
+                  <a:srgbClr val="333333"/>
+                </a:solidFill>
+                <a:effectLst/>
+                <a:latin typeface="MathJax_Main"/>
+              </a:rPr>
+              <a:t>⃗ </a:t>
+            </a:r>
+            <a:r>
+              <a:rPr kumimoji="0" lang="pl-PL" altLang="pl-PL" sz="3600" b="0" i="0" u="none" strike="noStrike" cap="none" normalizeH="0" baseline="0">
+                <a:ln>
+                  <a:noFill/>
+                </a:ln>
+                <a:solidFill>
+                  <a:srgbClr val="333333"/>
+                </a:solidFill>
+                <a:effectLst/>
+                <a:latin typeface="inherit"/>
+              </a:rPr>
+              <a:t>x→</a:t>
+            </a:r>
+            <a:r>
+              <a:rPr kumimoji="0" lang="pl-PL" altLang="pl-PL" sz="3600" b="0" i="0" u="none" strike="noStrike" cap="none" normalizeH="0" baseline="0">
+                <a:ln>
+                  <a:noFill/>
+                </a:ln>
+                <a:solidFill>
+                  <a:srgbClr val="333333"/>
+                </a:solidFill>
+                <a:effectLst/>
+                <a:latin typeface="EB Garamond" panose="00000500000000000000" pitchFamily="2" charset="0"/>
+              </a:rPr>
+              <a:t> mają inny wymiar, dokonywana jest liniowa projekcja </a:t>
+            </a:r>
+            <a:r>
+              <a:rPr kumimoji="0" lang="pl-PL" altLang="pl-PL" sz="3600" b="0" i="0" u="none" strike="noStrike" cap="none" normalizeH="0" baseline="0">
+                <a:ln>
+                  <a:noFill/>
+                </a:ln>
+                <a:solidFill>
+                  <a:srgbClr val="333333"/>
+                </a:solidFill>
+                <a:effectLst/>
+                <a:latin typeface="MathJax_Math-italic"/>
+              </a:rPr>
+              <a:t>W</a:t>
+            </a:r>
+            <a:r>
+              <a:rPr kumimoji="0" lang="pl-PL" altLang="pl-PL" sz="2500" b="0" i="0" u="none" strike="noStrike" cap="none" normalizeH="0" baseline="0">
+                <a:ln>
+                  <a:noFill/>
+                </a:ln>
+                <a:solidFill>
+                  <a:srgbClr val="333333"/>
+                </a:solidFill>
+                <a:effectLst/>
+                <a:latin typeface="MathJax_Math-italic"/>
+              </a:rPr>
+              <a:t>s</a:t>
+            </a:r>
+            <a:r>
+              <a:rPr kumimoji="0" lang="pl-PL" altLang="pl-PL" sz="3600" b="0" i="0" u="none" strike="noStrike" cap="none" normalizeH="0" baseline="0">
+                <a:ln>
+                  <a:noFill/>
+                </a:ln>
+                <a:solidFill>
+                  <a:srgbClr val="333333"/>
+                </a:solidFill>
+                <a:effectLst/>
+                <a:latin typeface="MathJax_Math-italic"/>
+              </a:rPr>
+              <a:t>x</a:t>
+            </a:r>
+            <a:r>
+              <a:rPr kumimoji="0" lang="pl-PL" altLang="pl-PL" sz="3600" b="0" i="0" u="none" strike="noStrike" cap="none" normalizeH="0" baseline="0">
+                <a:ln>
+                  <a:noFill/>
+                </a:ln>
+                <a:solidFill>
+                  <a:srgbClr val="333333"/>
+                </a:solidFill>
+                <a:effectLst/>
+                <a:latin typeface="MathJax_Main"/>
+              </a:rPr>
+              <a:t>⃗</a:t>
+            </a:r>
+            <a:endParaRPr kumimoji="0" lang="pl-PL" altLang="pl-PL" sz="3600" b="0" i="0" u="none" strike="noStrike" cap="none" normalizeH="0" baseline="0">
+              <a:ln>
+                <a:noFill/>
+              </a:ln>
+              <a:solidFill>
+                <a:srgbClr val="333333"/>
+              </a:solidFill>
+              <a:effectLst/>
+              <a:latin typeface="EB Garamond" panose="00000500000000000000" pitchFamily="2" charset="0"/>
+            </a:endParaRPr>
+          </a:p>
+          <a:p>
+            <a:pPr marL="0" marR="0" lvl="0" indent="0" algn="l" defTabSz="914400" rtl="0" eaLnBrk="0" fontAlgn="base" latinLnBrk="0" hangingPunct="0">
+              <a:lnSpc>
+                <a:spcPct val="100000"/>
+              </a:lnSpc>
+              <a:spcBef>
+                <a:spcPct val="0"/>
+              </a:spcBef>
+              <a:spcAft>
+                <a:spcPct val="0"/>
+              </a:spcAft>
+              <a:buClrTx/>
+              <a:buSzTx/>
+              <a:buFontTx/>
+              <a:buNone/>
+              <a:tabLst/>
+            </a:pPr>
+            <a:endParaRPr kumimoji="0" lang="pl-PL" altLang="pl-PL" sz="1800" b="0" i="0" u="none" strike="noStrike" cap="none" normalizeH="0" baseline="0">
+              <a:ln>
+                <a:noFill/>
+              </a:ln>
+              <a:solidFill>
+                <a:schemeClr val="tx1"/>
+              </a:solidFill>
+              <a:effectLst/>
+              <a:latin typeface="Arial" panose="020B0604020202020204" pitchFamily="34" charset="0"/>
+            </a:endParaRPr>
+          </a:p>
+        </p:txBody>
+      </p:sp>
+    </p:spTree>
+    <p:extLst>
+      <p:ext uri="{BB962C8B-B14F-4D97-AF65-F5344CB8AC3E}">
+        <p14:creationId xmlns:p14="http://schemas.microsoft.com/office/powerpoint/2010/main" val="2764912841"/>
+      </p:ext>
+    </p:extLst>
+  </p:cSld>
+  <p:clrMapOvr>
+    <a:masterClrMapping/>
+  </p:clrMapOvr>
+</p:sld>
+</file>
+
 <file path=ppt/slides/slide2.xml><?xml version="1.0" encoding="utf-8"?>
 <p:sld xmlns:a="http://schemas.openxmlformats.org/drawingml/2006/main" xmlns:r="http://schemas.openxmlformats.org/officeDocument/2006/relationships" xmlns:p="http://schemas.openxmlformats.org/presentationml/2006/main">
   <p:cSld>
@@ -5111,7 +7654,7 @@
           <a:p>
             <a:pPr algn="l"/>
             <a:r>
-              <a:rPr lang="en-US" sz="1800" b="0" i="0" u="none" strike="noStrike" baseline="0">
+              <a:rPr lang="en-US" sz="1800" b="0" i="0" u="none" strike="noStrike" baseline="0" dirty="0">
                 <a:latin typeface="NimbusRomNo9L-Regu"/>
               </a:rPr>
               <a:t>can be seen as the union of both forms of fusion.</a:t>

</xml_diff>